<commit_message>
Updated results in PPT
</commit_message>
<xml_diff>
--- a/Prefetch Procrastinator Final Presentation.pptx
+++ b/Prefetch Procrastinator Final Presentation.pptx
@@ -5,7 +5,7 @@
     <p:sldMasterId id="2147483648" r:id="rId1"/>
   </p:sldMasterIdLst>
   <p:notesMasterIdLst>
-    <p:notesMasterId r:id="rId23"/>
+    <p:notesMasterId r:id="rId24"/>
   </p:notesMasterIdLst>
   <p:sldIdLst>
     <p:sldId id="256" r:id="rId2"/>
@@ -26,9 +26,10 @@
     <p:sldId id="268" r:id="rId17"/>
     <p:sldId id="265" r:id="rId18"/>
     <p:sldId id="267" r:id="rId19"/>
-    <p:sldId id="269" r:id="rId20"/>
-    <p:sldId id="270" r:id="rId21"/>
-    <p:sldId id="266" r:id="rId22"/>
+    <p:sldId id="278" r:id="rId20"/>
+    <p:sldId id="279" r:id="rId21"/>
+    <p:sldId id="269" r:id="rId22"/>
+    <p:sldId id="270" r:id="rId23"/>
   </p:sldIdLst>
   <p:sldSz cx="12192000" cy="6858000"/>
   <p:notesSz cx="6858000" cy="9144000"/>
@@ -133,6 +134,1908 @@
     </p:ext>
   </p:extLst>
 </p:presentation>
+</file>
+
+<file path=ppt/charts/chart1.xml><?xml version="1.0" encoding="utf-8"?>
+<c:chartSpace xmlns:c="http://schemas.openxmlformats.org/drawingml/2006/chart" xmlns:a="http://schemas.openxmlformats.org/drawingml/2006/main" xmlns:r="http://schemas.openxmlformats.org/officeDocument/2006/relationships">
+  <c:date1904 val="0"/>
+  <c:lang val="en-US"/>
+  <c:roundedCorners val="0"/>
+  <mc:AlternateContent xmlns:mc="http://schemas.openxmlformats.org/markup-compatibility/2006">
+    <mc:Choice xmlns:c14="http://schemas.microsoft.com/office/drawing/2007/8/2/chart" Requires="c14">
+      <c14:style val="102"/>
+    </mc:Choice>
+    <mc:Fallback>
+      <c:style val="2"/>
+    </mc:Fallback>
+  </mc:AlternateContent>
+  <c:chart>
+    <c:title>
+      <c:tx>
+        <c:rich>
+          <a:bodyPr rot="0" spcFirstLastPara="1" vertOverflow="ellipsis" vert="horz" wrap="square" anchor="ctr" anchorCtr="1"/>
+          <a:lstStyle/>
+          <a:p>
+            <a:pPr>
+              <a:defRPr b="0" i="0" u="none" strike="noStrike" kern="1200" baseline="0">
+                <a:solidFill>
+                  <a:schemeClr val="dk1">
+                    <a:lumMod val="65000"/>
+                    <a:lumOff val="35000"/>
+                  </a:schemeClr>
+                </a:solidFill>
+                <a:effectLst/>
+                <a:latin typeface="+mn-lt"/>
+                <a:ea typeface="+mn-ea"/>
+                <a:cs typeface="+mn-cs"/>
+              </a:defRPr>
+            </a:pPr>
+            <a:r>
+              <a:rPr lang="en-US"/>
+              <a:t>View Prefetch Correlation UV-RISK</a:t>
+            </a:r>
+          </a:p>
+        </c:rich>
+      </c:tx>
+      <c:layout/>
+      <c:overlay val="0"/>
+      <c:spPr>
+        <a:noFill/>
+        <a:ln>
+          <a:noFill/>
+        </a:ln>
+        <a:effectLst/>
+      </c:spPr>
+      <c:txPr>
+        <a:bodyPr rot="0" spcFirstLastPara="1" vertOverflow="ellipsis" vert="horz" wrap="square" anchor="ctr" anchorCtr="1"/>
+        <a:lstStyle/>
+        <a:p>
+          <a:pPr>
+            <a:defRPr b="0" i="0" u="none" strike="noStrike" kern="1200" baseline="0">
+              <a:solidFill>
+                <a:schemeClr val="dk1">
+                  <a:lumMod val="65000"/>
+                  <a:lumOff val="35000"/>
+                </a:schemeClr>
+              </a:solidFill>
+              <a:effectLst/>
+              <a:latin typeface="+mn-lt"/>
+              <a:ea typeface="+mn-ea"/>
+              <a:cs typeface="+mn-cs"/>
+            </a:defRPr>
+          </a:pPr>
+          <a:endParaRPr lang="en-US"/>
+        </a:p>
+      </c:txPr>
+    </c:title>
+    <c:autoTitleDeleted val="0"/>
+    <c:plotArea>
+      <c:layout/>
+      <c:barChart>
+        <c:barDir val="col"/>
+        <c:grouping val="clustered"/>
+        <c:varyColors val="0"/>
+        <c:ser>
+          <c:idx val="0"/>
+          <c:order val="0"/>
+          <c:spPr>
+            <a:gradFill>
+              <a:gsLst>
+                <a:gs pos="0">
+                  <a:schemeClr val="accent1"/>
+                </a:gs>
+                <a:gs pos="100000">
+                  <a:schemeClr val="accent1">
+                    <a:lumMod val="84000"/>
+                  </a:schemeClr>
+                </a:gs>
+              </a:gsLst>
+              <a:lin ang="5400000" scaled="1"/>
+            </a:gradFill>
+            <a:ln>
+              <a:noFill/>
+            </a:ln>
+            <a:effectLst>
+              <a:outerShdw blurRad="76200" dir="18900000" sy="23000" kx="-1200000" algn="bl" rotWithShape="0">
+                <a:prstClr val="black">
+                  <a:alpha val="20000"/>
+                </a:prstClr>
+              </a:outerShdw>
+            </a:effectLst>
+          </c:spPr>
+          <c:invertIfNegative val="0"/>
+          <c:dLbls>
+            <c:spPr>
+              <a:noFill/>
+              <a:ln>
+                <a:noFill/>
+              </a:ln>
+              <a:effectLst/>
+            </c:spPr>
+            <c:txPr>
+              <a:bodyPr rot="0" spcFirstLastPara="1" vertOverflow="ellipsis" vert="horz" wrap="square" lIns="38100" tIns="19050" rIns="38100" bIns="19050" anchor="ctr" anchorCtr="1">
+                <a:spAutoFit/>
+              </a:bodyPr>
+              <a:lstStyle/>
+              <a:p>
+                <a:pPr>
+                  <a:defRPr sz="1500" b="1" i="0" u="none" strike="noStrike" kern="1200" baseline="0">
+                    <a:solidFill>
+                      <a:schemeClr val="lt1"/>
+                    </a:solidFill>
+                    <a:latin typeface="+mn-lt"/>
+                    <a:ea typeface="+mn-ea"/>
+                    <a:cs typeface="+mn-cs"/>
+                  </a:defRPr>
+                </a:pPr>
+                <a:endParaRPr lang="en-US"/>
+              </a:p>
+            </c:txPr>
+            <c:dLblPos val="inEnd"/>
+            <c:showLegendKey val="0"/>
+            <c:showVal val="1"/>
+            <c:showCatName val="0"/>
+            <c:showSerName val="0"/>
+            <c:showPercent val="0"/>
+            <c:showBubbleSize val="0"/>
+            <c:showLeaderLines val="0"/>
+            <c:extLst>
+              <c:ext xmlns:c15="http://schemas.microsoft.com/office/drawing/2012/chart" uri="{CE6537A1-D6FC-4f65-9D91-7224C49458BB}">
+                <c15:layout/>
+                <c15:showLeaderLines val="1"/>
+                <c15:leaderLines>
+                  <c:spPr>
+                    <a:ln w="9525">
+                      <a:solidFill>
+                        <a:schemeClr val="dk1">
+                          <a:lumMod val="50000"/>
+                          <a:lumOff val="50000"/>
+                        </a:schemeClr>
+                      </a:solidFill>
+                    </a:ln>
+                    <a:effectLst/>
+                  </c:spPr>
+                </c15:leaderLines>
+              </c:ext>
+            </c:extLst>
+          </c:dLbls>
+          <c:cat>
+            <c:strRef>
+              <c:f>Sheet1!$M$9:$M$12</c:f>
+              <c:strCache>
+                <c:ptCount val="4"/>
+                <c:pt idx="0">
+                  <c:v>User 1</c:v>
+                </c:pt>
+                <c:pt idx="1">
+                  <c:v>User 2</c:v>
+                </c:pt>
+                <c:pt idx="2">
+                  <c:v>User 3</c:v>
+                </c:pt>
+                <c:pt idx="3">
+                  <c:v>User 4</c:v>
+                </c:pt>
+              </c:strCache>
+            </c:strRef>
+          </c:cat>
+          <c:val>
+            <c:numRef>
+              <c:f>Sheet1!$N$9:$N$12</c:f>
+              <c:numCache>
+                <c:formatCode>0.00%</c:formatCode>
+                <c:ptCount val="4"/>
+                <c:pt idx="0">
+                  <c:v>5.6818E-2</c:v>
+                </c:pt>
+                <c:pt idx="1">
+                  <c:v>0.102273</c:v>
+                </c:pt>
+                <c:pt idx="2">
+                  <c:v>0.1666667</c:v>
+                </c:pt>
+                <c:pt idx="3">
+                  <c:v>0.44047599999999998</c:v>
+                </c:pt>
+              </c:numCache>
+            </c:numRef>
+          </c:val>
+        </c:ser>
+        <c:dLbls>
+          <c:dLblPos val="inEnd"/>
+          <c:showLegendKey val="0"/>
+          <c:showVal val="1"/>
+          <c:showCatName val="0"/>
+          <c:showSerName val="0"/>
+          <c:showPercent val="0"/>
+          <c:showBubbleSize val="0"/>
+        </c:dLbls>
+        <c:gapWidth val="41"/>
+        <c:axId val="1511936176"/>
+        <c:axId val="1511949776"/>
+      </c:barChart>
+      <c:catAx>
+        <c:axId val="1511936176"/>
+        <c:scaling>
+          <c:orientation val="minMax"/>
+        </c:scaling>
+        <c:delete val="0"/>
+        <c:axPos val="b"/>
+        <c:numFmt formatCode="General" sourceLinked="1"/>
+        <c:majorTickMark val="none"/>
+        <c:minorTickMark val="none"/>
+        <c:tickLblPos val="nextTo"/>
+        <c:spPr>
+          <a:noFill/>
+          <a:ln>
+            <a:noFill/>
+          </a:ln>
+          <a:effectLst/>
+        </c:spPr>
+        <c:txPr>
+          <a:bodyPr rot="-60000000" spcFirstLastPara="1" vertOverflow="ellipsis" vert="horz" wrap="square" anchor="ctr" anchorCtr="1"/>
+          <a:lstStyle/>
+          <a:p>
+            <a:pPr>
+              <a:defRPr sz="1500" b="0" i="0" u="none" strike="noStrike" kern="1200" baseline="0">
+                <a:solidFill>
+                  <a:schemeClr val="dk1">
+                    <a:lumMod val="65000"/>
+                    <a:lumOff val="35000"/>
+                  </a:schemeClr>
+                </a:solidFill>
+                <a:effectLst/>
+                <a:latin typeface="+mn-lt"/>
+                <a:ea typeface="+mn-ea"/>
+                <a:cs typeface="+mn-cs"/>
+              </a:defRPr>
+            </a:pPr>
+            <a:endParaRPr lang="en-US"/>
+          </a:p>
+        </c:txPr>
+        <c:crossAx val="1511949776"/>
+        <c:crosses val="autoZero"/>
+        <c:auto val="1"/>
+        <c:lblAlgn val="ctr"/>
+        <c:lblOffset val="100"/>
+        <c:noMultiLvlLbl val="0"/>
+      </c:catAx>
+      <c:valAx>
+        <c:axId val="1511949776"/>
+        <c:scaling>
+          <c:orientation val="minMax"/>
+        </c:scaling>
+        <c:delete val="1"/>
+        <c:axPos val="l"/>
+        <c:numFmt formatCode="0.00%" sourceLinked="1"/>
+        <c:majorTickMark val="none"/>
+        <c:minorTickMark val="none"/>
+        <c:tickLblPos val="nextTo"/>
+        <c:crossAx val="1511936176"/>
+        <c:crosses val="autoZero"/>
+        <c:crossBetween val="between"/>
+      </c:valAx>
+      <c:spPr>
+        <a:noFill/>
+        <a:ln>
+          <a:noFill/>
+        </a:ln>
+        <a:effectLst/>
+      </c:spPr>
+    </c:plotArea>
+    <c:plotVisOnly val="1"/>
+    <c:dispBlanksAs val="gap"/>
+    <c:showDLblsOverMax val="0"/>
+  </c:chart>
+  <c:spPr>
+    <a:gradFill flip="none" rotWithShape="1">
+      <a:gsLst>
+        <a:gs pos="0">
+          <a:schemeClr val="lt1"/>
+        </a:gs>
+        <a:gs pos="68000">
+          <a:schemeClr val="lt1">
+            <a:lumMod val="85000"/>
+          </a:schemeClr>
+        </a:gs>
+        <a:gs pos="100000">
+          <a:schemeClr val="lt1"/>
+        </a:gs>
+      </a:gsLst>
+      <a:lin ang="5400000" scaled="1"/>
+      <a:tileRect/>
+    </a:gradFill>
+    <a:ln w="9525" cap="flat" cmpd="sng" algn="ctr">
+      <a:solidFill>
+        <a:schemeClr val="dk1">
+          <a:lumMod val="15000"/>
+          <a:lumOff val="85000"/>
+        </a:schemeClr>
+      </a:solidFill>
+      <a:round/>
+    </a:ln>
+    <a:effectLst/>
+  </c:spPr>
+  <c:txPr>
+    <a:bodyPr/>
+    <a:lstStyle/>
+    <a:p>
+      <a:pPr>
+        <a:defRPr/>
+      </a:pPr>
+      <a:endParaRPr lang="en-US"/>
+    </a:p>
+  </c:txPr>
+  <c:externalData r:id="rId3">
+    <c:autoUpdate val="0"/>
+  </c:externalData>
+</c:chartSpace>
+</file>
+
+<file path=ppt/charts/chart2.xml><?xml version="1.0" encoding="utf-8"?>
+<c:chartSpace xmlns:c="http://schemas.openxmlformats.org/drawingml/2006/chart" xmlns:a="http://schemas.openxmlformats.org/drawingml/2006/main" xmlns:r="http://schemas.openxmlformats.org/officeDocument/2006/relationships">
+  <c:date1904 val="0"/>
+  <c:lang val="en-US"/>
+  <c:roundedCorners val="0"/>
+  <mc:AlternateContent xmlns:mc="http://schemas.openxmlformats.org/markup-compatibility/2006">
+    <mc:Choice xmlns:c14="http://schemas.microsoft.com/office/drawing/2007/8/2/chart" Requires="c14">
+      <c14:style val="102"/>
+    </mc:Choice>
+    <mc:Fallback>
+      <c:style val="2"/>
+    </mc:Fallback>
+  </mc:AlternateContent>
+  <c:chart>
+    <c:title>
+      <c:tx>
+        <c:rich>
+          <a:bodyPr rot="0" spcFirstLastPara="1" vertOverflow="ellipsis" vert="horz" wrap="square" anchor="ctr" anchorCtr="1"/>
+          <a:lstStyle/>
+          <a:p>
+            <a:pPr>
+              <a:defRPr sz="1500" b="0" i="0" u="none" strike="noStrike" kern="1200" spc="0" baseline="0">
+                <a:solidFill>
+                  <a:schemeClr val="tx1">
+                    <a:lumMod val="65000"/>
+                    <a:lumOff val="35000"/>
+                  </a:schemeClr>
+                </a:solidFill>
+                <a:latin typeface="+mn-lt"/>
+                <a:ea typeface="+mn-ea"/>
+                <a:cs typeface="+mn-cs"/>
+              </a:defRPr>
+            </a:pPr>
+            <a:r>
+              <a:rPr lang="en-US" sz="1500" baseline="0"/>
+              <a:t>Data Usage Procrastinated vs Non Procrastinated</a:t>
+            </a:r>
+          </a:p>
+          <a:p>
+            <a:pPr>
+              <a:defRPr sz="1500" baseline="0"/>
+            </a:pPr>
+            <a:endParaRPr lang="en-US" sz="1500" baseline="0"/>
+          </a:p>
+        </c:rich>
+      </c:tx>
+      <c:layout/>
+      <c:overlay val="0"/>
+      <c:spPr>
+        <a:noFill/>
+        <a:ln>
+          <a:noFill/>
+        </a:ln>
+        <a:effectLst/>
+      </c:spPr>
+      <c:txPr>
+        <a:bodyPr rot="0" spcFirstLastPara="1" vertOverflow="ellipsis" vert="horz" wrap="square" anchor="ctr" anchorCtr="1"/>
+        <a:lstStyle/>
+        <a:p>
+          <a:pPr>
+            <a:defRPr sz="1500" b="0" i="0" u="none" strike="noStrike" kern="1200" spc="0" baseline="0">
+              <a:solidFill>
+                <a:schemeClr val="tx1">
+                  <a:lumMod val="65000"/>
+                  <a:lumOff val="35000"/>
+                </a:schemeClr>
+              </a:solidFill>
+              <a:latin typeface="+mn-lt"/>
+              <a:ea typeface="+mn-ea"/>
+              <a:cs typeface="+mn-cs"/>
+            </a:defRPr>
+          </a:pPr>
+          <a:endParaRPr lang="en-US"/>
+        </a:p>
+      </c:txPr>
+    </c:title>
+    <c:autoTitleDeleted val="0"/>
+    <c:plotArea>
+      <c:layout/>
+      <c:barChart>
+        <c:barDir val="bar"/>
+        <c:grouping val="stacked"/>
+        <c:varyColors val="0"/>
+        <c:ser>
+          <c:idx val="0"/>
+          <c:order val="0"/>
+          <c:tx>
+            <c:v>Non-Procrastinated</c:v>
+          </c:tx>
+          <c:spPr>
+            <a:solidFill>
+              <a:schemeClr val="accent1"/>
+            </a:solidFill>
+            <a:ln>
+              <a:noFill/>
+            </a:ln>
+            <a:effectLst/>
+          </c:spPr>
+          <c:invertIfNegative val="0"/>
+          <c:dPt>
+            <c:idx val="2"/>
+            <c:invertIfNegative val="0"/>
+            <c:bubble3D val="0"/>
+            <c:spPr>
+              <a:solidFill>
+                <a:schemeClr val="accent2"/>
+              </a:solidFill>
+              <a:ln>
+                <a:noFill/>
+              </a:ln>
+              <a:effectLst/>
+            </c:spPr>
+          </c:dPt>
+          <c:dPt>
+            <c:idx val="3"/>
+            <c:invertIfNegative val="0"/>
+            <c:bubble3D val="0"/>
+            <c:spPr>
+              <a:solidFill>
+                <a:schemeClr val="accent2"/>
+              </a:solidFill>
+              <a:ln>
+                <a:noFill/>
+              </a:ln>
+              <a:effectLst/>
+            </c:spPr>
+          </c:dPt>
+          <c:cat>
+            <c:strRef>
+              <c:f>Sheet1!$M$16:$M$19</c:f>
+              <c:strCache>
+                <c:ptCount val="4"/>
+                <c:pt idx="0">
+                  <c:v>User 1</c:v>
+                </c:pt>
+                <c:pt idx="1">
+                  <c:v>User 2</c:v>
+                </c:pt>
+                <c:pt idx="2">
+                  <c:v>User 3</c:v>
+                </c:pt>
+                <c:pt idx="3">
+                  <c:v>User 4</c:v>
+                </c:pt>
+              </c:strCache>
+            </c:strRef>
+          </c:cat>
+          <c:val>
+            <c:numRef>
+              <c:f>Sheet1!$N$16:$N$19</c:f>
+              <c:numCache>
+                <c:formatCode>General</c:formatCode>
+                <c:ptCount val="4"/>
+                <c:pt idx="0">
+                  <c:v>477588</c:v>
+                </c:pt>
+                <c:pt idx="1">
+                  <c:v>455385</c:v>
+                </c:pt>
+                <c:pt idx="2">
+                  <c:v>279309</c:v>
+                </c:pt>
+                <c:pt idx="3">
+                  <c:v>347278</c:v>
+                </c:pt>
+              </c:numCache>
+            </c:numRef>
+          </c:val>
+        </c:ser>
+        <c:ser>
+          <c:idx val="1"/>
+          <c:order val="1"/>
+          <c:tx>
+            <c:v>Procrastinated</c:v>
+          </c:tx>
+          <c:spPr>
+            <a:solidFill>
+              <a:schemeClr val="accent2"/>
+            </a:solidFill>
+            <a:ln>
+              <a:noFill/>
+            </a:ln>
+            <a:effectLst/>
+          </c:spPr>
+          <c:invertIfNegative val="0"/>
+          <c:cat>
+            <c:strRef>
+              <c:f>Sheet1!$M$16:$M$19</c:f>
+              <c:strCache>
+                <c:ptCount val="4"/>
+                <c:pt idx="0">
+                  <c:v>User 1</c:v>
+                </c:pt>
+                <c:pt idx="1">
+                  <c:v>User 2</c:v>
+                </c:pt>
+                <c:pt idx="2">
+                  <c:v>User 3</c:v>
+                </c:pt>
+                <c:pt idx="3">
+                  <c:v>User 4</c:v>
+                </c:pt>
+              </c:strCache>
+            </c:strRef>
+          </c:cat>
+          <c:val>
+            <c:numRef>
+              <c:f>Sheet1!$O$16:$O$19</c:f>
+              <c:numCache>
+                <c:formatCode>General</c:formatCode>
+                <c:ptCount val="4"/>
+                <c:pt idx="0">
+                  <c:v>0</c:v>
+                </c:pt>
+                <c:pt idx="1">
+                  <c:v>0</c:v>
+                </c:pt>
+                <c:pt idx="2">
+                  <c:v>0</c:v>
+                </c:pt>
+                <c:pt idx="3">
+                  <c:v>0</c:v>
+                </c:pt>
+              </c:numCache>
+            </c:numRef>
+          </c:val>
+        </c:ser>
+        <c:dLbls>
+          <c:showLegendKey val="0"/>
+          <c:showVal val="0"/>
+          <c:showCatName val="0"/>
+          <c:showSerName val="0"/>
+          <c:showPercent val="0"/>
+          <c:showBubbleSize val="0"/>
+        </c:dLbls>
+        <c:gapWidth val="150"/>
+        <c:overlap val="100"/>
+        <c:axId val="1482967504"/>
+        <c:axId val="1482970768"/>
+      </c:barChart>
+      <c:catAx>
+        <c:axId val="1482967504"/>
+        <c:scaling>
+          <c:orientation val="minMax"/>
+        </c:scaling>
+        <c:delete val="0"/>
+        <c:axPos val="l"/>
+        <c:numFmt formatCode="General" sourceLinked="1"/>
+        <c:majorTickMark val="none"/>
+        <c:minorTickMark val="none"/>
+        <c:tickLblPos val="nextTo"/>
+        <c:spPr>
+          <a:noFill/>
+          <a:ln w="9525" cap="flat" cmpd="sng" algn="ctr">
+            <a:solidFill>
+              <a:schemeClr val="tx1">
+                <a:lumMod val="15000"/>
+                <a:lumOff val="85000"/>
+              </a:schemeClr>
+            </a:solidFill>
+            <a:round/>
+          </a:ln>
+          <a:effectLst/>
+        </c:spPr>
+        <c:txPr>
+          <a:bodyPr rot="-60000000" spcFirstLastPara="1" vertOverflow="ellipsis" vert="horz" wrap="square" anchor="ctr" anchorCtr="1"/>
+          <a:lstStyle/>
+          <a:p>
+            <a:pPr>
+              <a:defRPr sz="1500" b="0" i="0" u="none" strike="noStrike" kern="1200" baseline="0">
+                <a:solidFill>
+                  <a:schemeClr val="tx1">
+                    <a:lumMod val="65000"/>
+                    <a:lumOff val="35000"/>
+                  </a:schemeClr>
+                </a:solidFill>
+                <a:latin typeface="+mn-lt"/>
+                <a:ea typeface="+mn-ea"/>
+                <a:cs typeface="+mn-cs"/>
+              </a:defRPr>
+            </a:pPr>
+            <a:endParaRPr lang="en-US"/>
+          </a:p>
+        </c:txPr>
+        <c:crossAx val="1482970768"/>
+        <c:crosses val="autoZero"/>
+        <c:auto val="1"/>
+        <c:lblAlgn val="ctr"/>
+        <c:lblOffset val="100"/>
+        <c:noMultiLvlLbl val="0"/>
+      </c:catAx>
+      <c:valAx>
+        <c:axId val="1482970768"/>
+        <c:scaling>
+          <c:orientation val="minMax"/>
+        </c:scaling>
+        <c:delete val="0"/>
+        <c:axPos val="b"/>
+        <c:majorGridlines>
+          <c:spPr>
+            <a:ln w="9525" cap="flat" cmpd="sng" algn="ctr">
+              <a:solidFill>
+                <a:schemeClr val="tx1">
+                  <a:lumMod val="15000"/>
+                  <a:lumOff val="85000"/>
+                </a:schemeClr>
+              </a:solidFill>
+              <a:round/>
+            </a:ln>
+            <a:effectLst/>
+          </c:spPr>
+        </c:majorGridlines>
+        <c:numFmt formatCode="General" sourceLinked="1"/>
+        <c:majorTickMark val="none"/>
+        <c:minorTickMark val="none"/>
+        <c:tickLblPos val="nextTo"/>
+        <c:spPr>
+          <a:noFill/>
+          <a:ln>
+            <a:noFill/>
+          </a:ln>
+          <a:effectLst/>
+        </c:spPr>
+        <c:txPr>
+          <a:bodyPr rot="-60000000" spcFirstLastPara="1" vertOverflow="ellipsis" vert="horz" wrap="square" anchor="ctr" anchorCtr="1"/>
+          <a:lstStyle/>
+          <a:p>
+            <a:pPr>
+              <a:defRPr sz="1500" b="0" i="0" u="none" strike="noStrike" kern="1200" baseline="0">
+                <a:solidFill>
+                  <a:schemeClr val="tx1">
+                    <a:lumMod val="65000"/>
+                    <a:lumOff val="35000"/>
+                  </a:schemeClr>
+                </a:solidFill>
+                <a:latin typeface="+mn-lt"/>
+                <a:ea typeface="+mn-ea"/>
+                <a:cs typeface="+mn-cs"/>
+              </a:defRPr>
+            </a:pPr>
+            <a:endParaRPr lang="en-US"/>
+          </a:p>
+        </c:txPr>
+        <c:crossAx val="1482967504"/>
+        <c:crosses val="autoZero"/>
+        <c:crossBetween val="between"/>
+      </c:valAx>
+      <c:spPr>
+        <a:noFill/>
+        <a:ln>
+          <a:noFill/>
+        </a:ln>
+        <a:effectLst/>
+      </c:spPr>
+    </c:plotArea>
+    <c:legend>
+      <c:legendPos val="b"/>
+      <c:layout/>
+      <c:overlay val="0"/>
+      <c:spPr>
+        <a:noFill/>
+        <a:ln>
+          <a:noFill/>
+        </a:ln>
+        <a:effectLst/>
+      </c:spPr>
+      <c:txPr>
+        <a:bodyPr rot="0" spcFirstLastPara="1" vertOverflow="ellipsis" vert="horz" wrap="square" anchor="ctr" anchorCtr="1"/>
+        <a:lstStyle/>
+        <a:p>
+          <a:pPr>
+            <a:defRPr sz="1500" b="0" i="0" u="none" strike="noStrike" kern="1200" baseline="0">
+              <a:solidFill>
+                <a:schemeClr val="tx1">
+                  <a:lumMod val="65000"/>
+                  <a:lumOff val="35000"/>
+                </a:schemeClr>
+              </a:solidFill>
+              <a:latin typeface="+mn-lt"/>
+              <a:ea typeface="+mn-ea"/>
+              <a:cs typeface="+mn-cs"/>
+            </a:defRPr>
+          </a:pPr>
+          <a:endParaRPr lang="en-US"/>
+        </a:p>
+      </c:txPr>
+    </c:legend>
+    <c:plotVisOnly val="1"/>
+    <c:dispBlanksAs val="gap"/>
+    <c:showDLblsOverMax val="0"/>
+  </c:chart>
+  <c:spPr>
+    <a:noFill/>
+    <a:ln>
+      <a:noFill/>
+    </a:ln>
+    <a:effectLst/>
+  </c:spPr>
+  <c:txPr>
+    <a:bodyPr/>
+    <a:lstStyle/>
+    <a:p>
+      <a:pPr>
+        <a:defRPr/>
+      </a:pPr>
+      <a:endParaRPr lang="en-US"/>
+    </a:p>
+  </c:txPr>
+  <c:externalData r:id="rId3">
+    <c:autoUpdate val="0"/>
+  </c:externalData>
+</c:chartSpace>
+</file>
+
+<file path=ppt/charts/colors1.xml><?xml version="1.0" encoding="utf-8"?>
+<cs:colorStyle xmlns:cs="http://schemas.microsoft.com/office/drawing/2012/chartStyle" xmlns:a="http://schemas.openxmlformats.org/drawingml/2006/main" meth="cycle" id="10">
+  <a:schemeClr val="accent1"/>
+  <a:schemeClr val="accent2"/>
+  <a:schemeClr val="accent3"/>
+  <a:schemeClr val="accent4"/>
+  <a:schemeClr val="accent5"/>
+  <a:schemeClr val="accent6"/>
+  <cs:variation/>
+  <cs:variation>
+    <a:lumMod val="60000"/>
+  </cs:variation>
+  <cs:variation>
+    <a:lumMod val="80000"/>
+    <a:lumOff val="20000"/>
+  </cs:variation>
+  <cs:variation>
+    <a:lumMod val="80000"/>
+  </cs:variation>
+  <cs:variation>
+    <a:lumMod val="60000"/>
+    <a:lumOff val="40000"/>
+  </cs:variation>
+  <cs:variation>
+    <a:lumMod val="50000"/>
+  </cs:variation>
+  <cs:variation>
+    <a:lumMod val="70000"/>
+    <a:lumOff val="30000"/>
+  </cs:variation>
+  <cs:variation>
+    <a:lumMod val="70000"/>
+  </cs:variation>
+  <cs:variation>
+    <a:lumMod val="50000"/>
+    <a:lumOff val="50000"/>
+  </cs:variation>
+</cs:colorStyle>
+</file>
+
+<file path=ppt/charts/colors2.xml><?xml version="1.0" encoding="utf-8"?>
+<cs:colorStyle xmlns:cs="http://schemas.microsoft.com/office/drawing/2012/chartStyle" xmlns:a="http://schemas.openxmlformats.org/drawingml/2006/main" meth="cycle" id="10">
+  <a:schemeClr val="accent1"/>
+  <a:schemeClr val="accent2"/>
+  <a:schemeClr val="accent3"/>
+  <a:schemeClr val="accent4"/>
+  <a:schemeClr val="accent5"/>
+  <a:schemeClr val="accent6"/>
+  <cs:variation/>
+  <cs:variation>
+    <a:lumMod val="60000"/>
+  </cs:variation>
+  <cs:variation>
+    <a:lumMod val="80000"/>
+    <a:lumOff val="20000"/>
+  </cs:variation>
+  <cs:variation>
+    <a:lumMod val="80000"/>
+  </cs:variation>
+  <cs:variation>
+    <a:lumMod val="60000"/>
+    <a:lumOff val="40000"/>
+  </cs:variation>
+  <cs:variation>
+    <a:lumMod val="50000"/>
+  </cs:variation>
+  <cs:variation>
+    <a:lumMod val="70000"/>
+    <a:lumOff val="30000"/>
+  </cs:variation>
+  <cs:variation>
+    <a:lumMod val="70000"/>
+  </cs:variation>
+  <cs:variation>
+    <a:lumMod val="50000"/>
+    <a:lumOff val="50000"/>
+  </cs:variation>
+</cs:colorStyle>
+</file>
+
+<file path=ppt/charts/style1.xml><?xml version="1.0" encoding="utf-8"?>
+<cs:chartStyle xmlns:cs="http://schemas.microsoft.com/office/drawing/2012/chartStyle" xmlns:a="http://schemas.openxmlformats.org/drawingml/2006/main" id="204">
+  <cs:axisTitle>
+    <cs:lnRef idx="0"/>
+    <cs:fillRef idx="0"/>
+    <cs:effectRef idx="0"/>
+    <cs:fontRef idx="minor">
+      <a:schemeClr val="dk1">
+        <a:lumMod val="65000"/>
+        <a:lumOff val="35000"/>
+      </a:schemeClr>
+    </cs:fontRef>
+    <cs:defRPr sz="1197" b="1" kern="1200"/>
+  </cs:axisTitle>
+  <cs:categoryAxis>
+    <cs:lnRef idx="0"/>
+    <cs:fillRef idx="0"/>
+    <cs:effectRef idx="0"/>
+    <cs:fontRef idx="minor">
+      <a:schemeClr val="dk1">
+        <a:lumMod val="65000"/>
+        <a:lumOff val="35000"/>
+      </a:schemeClr>
+    </cs:fontRef>
+    <cs:defRPr sz="1197" kern="1200">
+      <a:effectLst/>
+    </cs:defRPr>
+  </cs:categoryAxis>
+  <cs:chartArea>
+    <cs:lnRef idx="0"/>
+    <cs:fillRef idx="0"/>
+    <cs:effectRef idx="0"/>
+    <cs:fontRef idx="minor">
+      <a:schemeClr val="dk1"/>
+    </cs:fontRef>
+    <cs:spPr>
+      <a:gradFill flip="none" rotWithShape="1">
+        <a:gsLst>
+          <a:gs pos="0">
+            <a:schemeClr val="lt1"/>
+          </a:gs>
+          <a:gs pos="68000">
+            <a:schemeClr val="lt1">
+              <a:lumMod val="85000"/>
+            </a:schemeClr>
+          </a:gs>
+          <a:gs pos="100000">
+            <a:schemeClr val="lt1"/>
+          </a:gs>
+        </a:gsLst>
+        <a:lin ang="5400000" scaled="1"/>
+        <a:tileRect/>
+      </a:gradFill>
+      <a:ln w="9525" cap="flat" cmpd="sng" algn="ctr">
+        <a:solidFill>
+          <a:schemeClr val="dk1">
+            <a:lumMod val="15000"/>
+            <a:lumOff val="85000"/>
+          </a:schemeClr>
+        </a:solidFill>
+        <a:round/>
+      </a:ln>
+    </cs:spPr>
+    <cs:defRPr sz="1330" kern="1200"/>
+  </cs:chartArea>
+  <cs:dataLabel>
+    <cs:lnRef idx="0"/>
+    <cs:fillRef idx="0"/>
+    <cs:effectRef idx="0"/>
+    <cs:fontRef idx="minor">
+      <a:schemeClr val="lt1"/>
+    </cs:fontRef>
+    <cs:spPr/>
+    <cs:defRPr sz="1330" b="1" i="0" u="none" strike="noStrike" kern="1200" baseline="0"/>
+  </cs:dataLabel>
+  <cs:dataLabelCallout>
+    <cs:lnRef idx="0"/>
+    <cs:fillRef idx="0"/>
+    <cs:effectRef idx="0"/>
+    <cs:fontRef idx="minor">
+      <a:schemeClr val="lt1"/>
+    </cs:fontRef>
+    <cs:spPr>
+      <a:solidFill>
+        <a:schemeClr val="dk1">
+          <a:lumMod val="65000"/>
+          <a:lumOff val="35000"/>
+          <a:alpha val="75000"/>
+        </a:schemeClr>
+      </a:solidFill>
+    </cs:spPr>
+    <cs:defRPr sz="1330" b="1" kern="1200"/>
+    <cs:bodyPr rot="0" spcFirstLastPara="1" vertOverflow="clip" horzOverflow="clip" vert="horz" wrap="square" lIns="36576" tIns="18288" rIns="36576" bIns="18288" anchor="ctr" anchorCtr="1">
+      <a:spAutoFit/>
+    </cs:bodyPr>
+  </cs:dataLabelCallout>
+  <cs:dataPoint>
+    <cs:lnRef idx="0">
+      <cs:styleClr val="auto"/>
+    </cs:lnRef>
+    <cs:fillRef idx="0">
+      <cs:styleClr val="auto"/>
+    </cs:fillRef>
+    <cs:effectRef idx="0"/>
+    <cs:fontRef idx="minor">
+      <a:schemeClr val="dk1"/>
+    </cs:fontRef>
+    <cs:spPr>
+      <a:gradFill>
+        <a:gsLst>
+          <a:gs pos="0">
+            <a:schemeClr val="phClr"/>
+          </a:gs>
+          <a:gs pos="100000">
+            <a:schemeClr val="phClr">
+              <a:lumMod val="84000"/>
+            </a:schemeClr>
+          </a:gs>
+        </a:gsLst>
+        <a:lin ang="5400000" scaled="1"/>
+      </a:gradFill>
+      <a:effectLst>
+        <a:outerShdw blurRad="76200" dir="18900000" sy="23000" kx="-1200000" algn="bl" rotWithShape="0">
+          <a:prstClr val="black">
+            <a:alpha val="20000"/>
+          </a:prstClr>
+        </a:outerShdw>
+      </a:effectLst>
+    </cs:spPr>
+  </cs:dataPoint>
+  <cs:dataPoint3D>
+    <cs:lnRef idx="0"/>
+    <cs:fillRef idx="0">
+      <cs:styleClr val="auto"/>
+    </cs:fillRef>
+    <cs:effectRef idx="0"/>
+    <cs:fontRef idx="minor">
+      <a:schemeClr val="dk1"/>
+    </cs:fontRef>
+    <cs:spPr>
+      <a:gradFill>
+        <a:gsLst>
+          <a:gs pos="0">
+            <a:schemeClr val="phClr"/>
+          </a:gs>
+          <a:gs pos="100000">
+            <a:schemeClr val="phClr">
+              <a:lumMod val="84000"/>
+            </a:schemeClr>
+          </a:gs>
+        </a:gsLst>
+        <a:lin ang="5400000" scaled="1"/>
+      </a:gradFill>
+      <a:effectLst>
+        <a:outerShdw blurRad="76200" dir="18900000" sy="23000" kx="-1200000" algn="bl" rotWithShape="0">
+          <a:prstClr val="black">
+            <a:alpha val="20000"/>
+          </a:prstClr>
+        </a:outerShdw>
+      </a:effectLst>
+    </cs:spPr>
+  </cs:dataPoint3D>
+  <cs:dataPointLine>
+    <cs:lnRef idx="0">
+      <cs:styleClr val="auto"/>
+    </cs:lnRef>
+    <cs:fillRef idx="0"/>
+    <cs:effectRef idx="0"/>
+    <cs:fontRef idx="minor">
+      <a:schemeClr val="dk1"/>
+    </cs:fontRef>
+    <cs:spPr>
+      <a:ln w="28575" cap="rnd">
+        <a:gradFill>
+          <a:gsLst>
+            <a:gs pos="0">
+              <a:schemeClr val="phClr"/>
+            </a:gs>
+            <a:gs pos="100000">
+              <a:schemeClr val="phClr">
+                <a:lumMod val="84000"/>
+              </a:schemeClr>
+            </a:gs>
+          </a:gsLst>
+          <a:lin ang="5400000" scaled="1"/>
+        </a:gradFill>
+        <a:round/>
+      </a:ln>
+    </cs:spPr>
+  </cs:dataPointLine>
+  <cs:dataPointMarker>
+    <cs:lnRef idx="0"/>
+    <cs:fillRef idx="0">
+      <cs:styleClr val="auto"/>
+    </cs:fillRef>
+    <cs:effectRef idx="0"/>
+    <cs:fontRef idx="minor">
+      <a:schemeClr val="dk1"/>
+    </cs:fontRef>
+    <cs:spPr>
+      <a:gradFill>
+        <a:gsLst>
+          <a:gs pos="0">
+            <a:schemeClr val="phClr"/>
+          </a:gs>
+          <a:gs pos="100000">
+            <a:schemeClr val="phClr">
+              <a:lumMod val="84000"/>
+            </a:schemeClr>
+          </a:gs>
+        </a:gsLst>
+        <a:lin ang="5400000" scaled="1"/>
+      </a:gradFill>
+      <a:effectLst>
+        <a:outerShdw blurRad="76200" dir="18900000" sy="23000" kx="-1200000" algn="bl" rotWithShape="0">
+          <a:prstClr val="black">
+            <a:alpha val="20000"/>
+          </a:prstClr>
+        </a:outerShdw>
+      </a:effectLst>
+    </cs:spPr>
+  </cs:dataPointMarker>
+  <cs:dataPointMarkerLayout symbol="circle" size="6"/>
+  <cs:dataPointWireframe>
+    <cs:lnRef idx="0">
+      <cs:styleClr val="auto"/>
+    </cs:lnRef>
+    <cs:fillRef idx="0"/>
+    <cs:effectRef idx="0"/>
+    <cs:fontRef idx="minor">
+      <a:schemeClr val="dk1"/>
+    </cs:fontRef>
+    <cs:spPr>
+      <a:ln w="9525" cap="rnd">
+        <a:solidFill>
+          <a:schemeClr val="phClr"/>
+        </a:solidFill>
+        <a:round/>
+      </a:ln>
+    </cs:spPr>
+  </cs:dataPointWireframe>
+  <cs:dataTable>
+    <cs:lnRef idx="0"/>
+    <cs:fillRef idx="0"/>
+    <cs:effectRef idx="0"/>
+    <cs:fontRef idx="minor">
+      <a:schemeClr val="dk1">
+        <a:lumMod val="65000"/>
+        <a:lumOff val="35000"/>
+      </a:schemeClr>
+    </cs:fontRef>
+    <cs:spPr>
+      <a:ln w="9525">
+        <a:solidFill>
+          <a:schemeClr val="dk1">
+            <a:lumMod val="15000"/>
+            <a:lumOff val="85000"/>
+          </a:schemeClr>
+        </a:solidFill>
+      </a:ln>
+    </cs:spPr>
+    <cs:defRPr sz="1197" kern="1200"/>
+  </cs:dataTable>
+  <cs:downBar>
+    <cs:lnRef idx="0"/>
+    <cs:fillRef idx="0"/>
+    <cs:effectRef idx="0"/>
+    <cs:fontRef idx="minor">
+      <a:schemeClr val="dk1"/>
+    </cs:fontRef>
+    <cs:spPr>
+      <a:solidFill>
+        <a:schemeClr val="dk1">
+          <a:lumMod val="35000"/>
+          <a:lumOff val="65000"/>
+        </a:schemeClr>
+      </a:solidFill>
+      <a:ln w="9525">
+        <a:solidFill>
+          <a:schemeClr val="dk1">
+            <a:lumMod val="50000"/>
+            <a:lumOff val="50000"/>
+          </a:schemeClr>
+        </a:solidFill>
+      </a:ln>
+    </cs:spPr>
+  </cs:downBar>
+  <cs:dropLine>
+    <cs:lnRef idx="0"/>
+    <cs:fillRef idx="0"/>
+    <cs:effectRef idx="0"/>
+    <cs:fontRef idx="minor">
+      <a:schemeClr val="dk1"/>
+    </cs:fontRef>
+    <cs:spPr>
+      <a:ln w="9525">
+        <a:solidFill>
+          <a:schemeClr val="dk1">
+            <a:lumMod val="50000"/>
+            <a:lumOff val="50000"/>
+          </a:schemeClr>
+        </a:solidFill>
+        <a:round/>
+      </a:ln>
+    </cs:spPr>
+  </cs:dropLine>
+  <cs:errorBar>
+    <cs:lnRef idx="0"/>
+    <cs:fillRef idx="0"/>
+    <cs:effectRef idx="0"/>
+    <cs:fontRef idx="minor">
+      <a:schemeClr val="dk1"/>
+    </cs:fontRef>
+    <cs:spPr>
+      <a:ln w="9525">
+        <a:solidFill>
+          <a:schemeClr val="dk1">
+            <a:lumMod val="50000"/>
+            <a:lumOff val="50000"/>
+          </a:schemeClr>
+        </a:solidFill>
+        <a:round/>
+      </a:ln>
+    </cs:spPr>
+  </cs:errorBar>
+  <cs:floor>
+    <cs:lnRef idx="0"/>
+    <cs:fillRef idx="0"/>
+    <cs:effectRef idx="0"/>
+    <cs:fontRef idx="minor">
+      <a:schemeClr val="dk1"/>
+    </cs:fontRef>
+  </cs:floor>
+  <cs:gridlineMajor>
+    <cs:lnRef idx="0"/>
+    <cs:fillRef idx="0"/>
+    <cs:effectRef idx="0"/>
+    <cs:fontRef idx="minor">
+      <a:schemeClr val="dk1"/>
+    </cs:fontRef>
+    <cs:spPr>
+      <a:ln w="9525" cap="flat" cmpd="sng" algn="ctr">
+        <a:solidFill>
+          <a:schemeClr val="dk1">
+            <a:lumMod val="15000"/>
+            <a:lumOff val="85000"/>
+          </a:schemeClr>
+        </a:solidFill>
+        <a:round/>
+      </a:ln>
+    </cs:spPr>
+  </cs:gridlineMajor>
+  <cs:gridlineMinor>
+    <cs:lnRef idx="0"/>
+    <cs:fillRef idx="0"/>
+    <cs:effectRef idx="0"/>
+    <cs:fontRef idx="minor">
+      <a:schemeClr val="dk1"/>
+    </cs:fontRef>
+    <cs:spPr>
+      <a:ln>
+        <a:solidFill>
+          <a:schemeClr val="dk1">
+            <a:lumMod val="5000"/>
+            <a:lumOff val="95000"/>
+          </a:schemeClr>
+        </a:solidFill>
+      </a:ln>
+    </cs:spPr>
+  </cs:gridlineMinor>
+  <cs:hiLoLine>
+    <cs:lnRef idx="0"/>
+    <cs:fillRef idx="0"/>
+    <cs:effectRef idx="0"/>
+    <cs:fontRef idx="minor">
+      <a:schemeClr val="dk1"/>
+    </cs:fontRef>
+    <cs:spPr>
+      <a:ln w="9525">
+        <a:solidFill>
+          <a:schemeClr val="dk1">
+            <a:lumMod val="50000"/>
+            <a:lumOff val="50000"/>
+          </a:schemeClr>
+        </a:solidFill>
+        <a:round/>
+      </a:ln>
+    </cs:spPr>
+  </cs:hiLoLine>
+  <cs:leaderLine>
+    <cs:lnRef idx="0"/>
+    <cs:fillRef idx="0"/>
+    <cs:effectRef idx="0"/>
+    <cs:fontRef idx="minor">
+      <a:schemeClr val="dk1"/>
+    </cs:fontRef>
+    <cs:spPr>
+      <a:ln w="9525">
+        <a:solidFill>
+          <a:schemeClr val="dk1">
+            <a:lumMod val="50000"/>
+            <a:lumOff val="50000"/>
+          </a:schemeClr>
+        </a:solidFill>
+      </a:ln>
+    </cs:spPr>
+  </cs:leaderLine>
+  <cs:legend>
+    <cs:lnRef idx="0"/>
+    <cs:fillRef idx="0"/>
+    <cs:effectRef idx="0"/>
+    <cs:fontRef idx="minor">
+      <a:schemeClr val="dk1">
+        <a:lumMod val="65000"/>
+        <a:lumOff val="35000"/>
+      </a:schemeClr>
+    </cs:fontRef>
+    <cs:defRPr sz="1197" kern="1200"/>
+  </cs:legend>
+  <cs:plotArea>
+    <cs:lnRef idx="0"/>
+    <cs:fillRef idx="0"/>
+    <cs:effectRef idx="0"/>
+    <cs:fontRef idx="minor">
+      <a:schemeClr val="dk1"/>
+    </cs:fontRef>
+  </cs:plotArea>
+  <cs:plotArea3D>
+    <cs:lnRef idx="0"/>
+    <cs:fillRef idx="0"/>
+    <cs:effectRef idx="0"/>
+    <cs:fontRef idx="minor">
+      <a:schemeClr val="dk1"/>
+    </cs:fontRef>
+  </cs:plotArea3D>
+  <cs:seriesAxis>
+    <cs:lnRef idx="0"/>
+    <cs:fillRef idx="0"/>
+    <cs:effectRef idx="0"/>
+    <cs:fontRef idx="minor">
+      <a:schemeClr val="dk1">
+        <a:lumMod val="65000"/>
+        <a:lumOff val="35000"/>
+      </a:schemeClr>
+    </cs:fontRef>
+    <cs:spPr>
+      <a:ln w="9525" cap="flat" cmpd="sng" algn="ctr">
+        <a:solidFill>
+          <a:schemeClr val="dk1">
+            <a:lumMod val="15000"/>
+            <a:lumOff val="85000"/>
+          </a:schemeClr>
+        </a:solidFill>
+        <a:round/>
+      </a:ln>
+    </cs:spPr>
+    <cs:defRPr sz="1197" kern="1200"/>
+  </cs:seriesAxis>
+  <cs:seriesLine>
+    <cs:lnRef idx="0"/>
+    <cs:fillRef idx="0"/>
+    <cs:effectRef idx="0"/>
+    <cs:fontRef idx="minor">
+      <a:schemeClr val="dk1"/>
+    </cs:fontRef>
+    <cs:spPr>
+      <a:ln w="9525">
+        <a:solidFill>
+          <a:schemeClr val="dk1">
+            <a:lumMod val="50000"/>
+            <a:lumOff val="50000"/>
+          </a:schemeClr>
+        </a:solidFill>
+        <a:round/>
+      </a:ln>
+    </cs:spPr>
+  </cs:seriesLine>
+  <cs:title>
+    <cs:lnRef idx="0"/>
+    <cs:fillRef idx="0"/>
+    <cs:effectRef idx="0"/>
+    <cs:fontRef idx="minor">
+      <a:schemeClr val="dk1">
+        <a:lumMod val="65000"/>
+        <a:lumOff val="35000"/>
+      </a:schemeClr>
+    </cs:fontRef>
+    <cs:defRPr kern="1200">
+      <a:effectLst/>
+    </cs:defRPr>
+  </cs:title>
+  <cs:trendline>
+    <cs:lnRef idx="0">
+      <cs:styleClr val="auto"/>
+    </cs:lnRef>
+    <cs:fillRef idx="0"/>
+    <cs:effectRef idx="0"/>
+    <cs:fontRef idx="minor">
+      <a:schemeClr val="dk1"/>
+    </cs:fontRef>
+    <cs:spPr>
+      <a:ln w="19050" cap="rnd">
+        <a:solidFill>
+          <a:schemeClr val="phClr"/>
+        </a:solidFill>
+        <a:prstDash val="sysDash"/>
+      </a:ln>
+    </cs:spPr>
+  </cs:trendline>
+  <cs:trendlineLabel>
+    <cs:lnRef idx="0"/>
+    <cs:fillRef idx="0"/>
+    <cs:effectRef idx="0"/>
+    <cs:fontRef idx="minor">
+      <a:schemeClr val="dk1">
+        <a:lumMod val="65000"/>
+        <a:lumOff val="35000"/>
+      </a:schemeClr>
+    </cs:fontRef>
+    <cs:defRPr sz="1197" kern="1200"/>
+  </cs:trendlineLabel>
+  <cs:upBar>
+    <cs:lnRef idx="0"/>
+    <cs:fillRef idx="0"/>
+    <cs:effectRef idx="0"/>
+    <cs:fontRef idx="minor">
+      <a:schemeClr val="dk1"/>
+    </cs:fontRef>
+    <cs:spPr>
+      <a:solidFill>
+        <a:schemeClr val="lt1">
+          <a:lumMod val="95000"/>
+        </a:schemeClr>
+      </a:solidFill>
+      <a:ln w="9525">
+        <a:solidFill>
+          <a:schemeClr val="dk1">
+            <a:lumMod val="15000"/>
+            <a:lumOff val="85000"/>
+          </a:schemeClr>
+        </a:solidFill>
+      </a:ln>
+    </cs:spPr>
+  </cs:upBar>
+  <cs:valueAxis>
+    <cs:lnRef idx="0"/>
+    <cs:fillRef idx="0"/>
+    <cs:effectRef idx="0"/>
+    <cs:fontRef idx="minor">
+      <a:schemeClr val="dk1">
+        <a:lumMod val="65000"/>
+        <a:lumOff val="35000"/>
+      </a:schemeClr>
+    </cs:fontRef>
+    <cs:defRPr sz="1197" kern="1200"/>
+  </cs:valueAxis>
+  <cs:wall>
+    <cs:lnRef idx="0"/>
+    <cs:fillRef idx="0"/>
+    <cs:effectRef idx="0"/>
+    <cs:fontRef idx="minor">
+      <a:schemeClr val="dk1"/>
+    </cs:fontRef>
+  </cs:wall>
+</cs:chartStyle>
+</file>
+
+<file path=ppt/charts/style2.xml><?xml version="1.0" encoding="utf-8"?>
+<cs:chartStyle xmlns:cs="http://schemas.microsoft.com/office/drawing/2012/chartStyle" xmlns:a="http://schemas.openxmlformats.org/drawingml/2006/main" id="297">
+  <cs:axisTitle>
+    <cs:lnRef idx="0"/>
+    <cs:fillRef idx="0"/>
+    <cs:effectRef idx="0"/>
+    <cs:fontRef idx="minor">
+      <a:schemeClr val="tx1">
+        <a:lumMod val="65000"/>
+        <a:lumOff val="35000"/>
+      </a:schemeClr>
+    </cs:fontRef>
+    <cs:defRPr sz="1000" kern="1200"/>
+  </cs:axisTitle>
+  <cs:categoryAxis>
+    <cs:lnRef idx="0"/>
+    <cs:fillRef idx="0"/>
+    <cs:effectRef idx="0"/>
+    <cs:fontRef idx="minor">
+      <a:schemeClr val="tx1">
+        <a:lumMod val="65000"/>
+        <a:lumOff val="35000"/>
+      </a:schemeClr>
+    </cs:fontRef>
+    <cs:spPr>
+      <a:ln w="9525" cap="flat" cmpd="sng" algn="ctr">
+        <a:solidFill>
+          <a:schemeClr val="tx1">
+            <a:lumMod val="15000"/>
+            <a:lumOff val="85000"/>
+          </a:schemeClr>
+        </a:solidFill>
+        <a:round/>
+      </a:ln>
+    </cs:spPr>
+    <cs:defRPr sz="900" kern="1200"/>
+  </cs:categoryAxis>
+  <cs:chartArea mods="allowNoFillOverride allowNoLineOverride">
+    <cs:lnRef idx="0"/>
+    <cs:fillRef idx="0"/>
+    <cs:effectRef idx="0"/>
+    <cs:fontRef idx="minor">
+      <a:schemeClr val="tx1"/>
+    </cs:fontRef>
+    <cs:spPr>
+      <a:solidFill>
+        <a:schemeClr val="bg1"/>
+      </a:solidFill>
+      <a:ln w="9525" cap="flat" cmpd="sng" algn="ctr">
+        <a:solidFill>
+          <a:schemeClr val="tx1">
+            <a:lumMod val="15000"/>
+            <a:lumOff val="85000"/>
+          </a:schemeClr>
+        </a:solidFill>
+        <a:round/>
+      </a:ln>
+    </cs:spPr>
+    <cs:defRPr sz="1000" kern="1200"/>
+  </cs:chartArea>
+  <cs:dataLabel>
+    <cs:lnRef idx="0"/>
+    <cs:fillRef idx="0"/>
+    <cs:effectRef idx="0"/>
+    <cs:fontRef idx="minor">
+      <a:schemeClr val="tx1">
+        <a:lumMod val="75000"/>
+        <a:lumOff val="25000"/>
+      </a:schemeClr>
+    </cs:fontRef>
+    <cs:defRPr sz="900" kern="1200"/>
+  </cs:dataLabel>
+  <cs:dataLabelCallout>
+    <cs:lnRef idx="0"/>
+    <cs:fillRef idx="0"/>
+    <cs:effectRef idx="0"/>
+    <cs:fontRef idx="minor">
+      <a:schemeClr val="dk1">
+        <a:lumMod val="65000"/>
+        <a:lumOff val="35000"/>
+      </a:schemeClr>
+    </cs:fontRef>
+    <cs:spPr>
+      <a:solidFill>
+        <a:schemeClr val="lt1"/>
+      </a:solidFill>
+      <a:ln>
+        <a:solidFill>
+          <a:schemeClr val="dk1">
+            <a:lumMod val="25000"/>
+            <a:lumOff val="75000"/>
+          </a:schemeClr>
+        </a:solidFill>
+      </a:ln>
+    </cs:spPr>
+    <cs:defRPr sz="900" kern="1200"/>
+    <cs:bodyPr rot="0" spcFirstLastPara="1" vertOverflow="clip" horzOverflow="clip" vert="horz" wrap="square" lIns="36576" tIns="18288" rIns="36576" bIns="18288" anchor="ctr" anchorCtr="1">
+      <a:spAutoFit/>
+    </cs:bodyPr>
+  </cs:dataLabelCallout>
+  <cs:dataPoint>
+    <cs:lnRef idx="0"/>
+    <cs:fillRef idx="1">
+      <cs:styleClr val="auto"/>
+    </cs:fillRef>
+    <cs:effectRef idx="0"/>
+    <cs:fontRef idx="minor">
+      <a:schemeClr val="tx1"/>
+    </cs:fontRef>
+  </cs:dataPoint>
+  <cs:dataPoint3D>
+    <cs:lnRef idx="0"/>
+    <cs:fillRef idx="1">
+      <cs:styleClr val="auto"/>
+    </cs:fillRef>
+    <cs:effectRef idx="0"/>
+    <cs:fontRef idx="minor">
+      <a:schemeClr val="tx1"/>
+    </cs:fontRef>
+  </cs:dataPoint3D>
+  <cs:dataPointLine>
+    <cs:lnRef idx="0">
+      <cs:styleClr val="auto"/>
+    </cs:lnRef>
+    <cs:fillRef idx="1"/>
+    <cs:effectRef idx="0"/>
+    <cs:fontRef idx="minor">
+      <a:schemeClr val="tx1"/>
+    </cs:fontRef>
+    <cs:spPr>
+      <a:ln w="28575" cap="rnd">
+        <a:solidFill>
+          <a:schemeClr val="phClr"/>
+        </a:solidFill>
+        <a:round/>
+      </a:ln>
+    </cs:spPr>
+  </cs:dataPointLine>
+  <cs:dataPointMarker>
+    <cs:lnRef idx="0">
+      <cs:styleClr val="auto"/>
+    </cs:lnRef>
+    <cs:fillRef idx="1">
+      <cs:styleClr val="auto"/>
+    </cs:fillRef>
+    <cs:effectRef idx="0"/>
+    <cs:fontRef idx="minor">
+      <a:schemeClr val="tx1"/>
+    </cs:fontRef>
+    <cs:spPr>
+      <a:ln w="9525">
+        <a:solidFill>
+          <a:schemeClr val="phClr"/>
+        </a:solidFill>
+      </a:ln>
+    </cs:spPr>
+  </cs:dataPointMarker>
+  <cs:dataPointMarkerLayout symbol="circle" size="5"/>
+  <cs:dataPointWireframe>
+    <cs:lnRef idx="0">
+      <cs:styleClr val="auto"/>
+    </cs:lnRef>
+    <cs:fillRef idx="1"/>
+    <cs:effectRef idx="0"/>
+    <cs:fontRef idx="minor">
+      <a:schemeClr val="tx1"/>
+    </cs:fontRef>
+    <cs:spPr>
+      <a:ln w="9525" cap="rnd">
+        <a:solidFill>
+          <a:schemeClr val="phClr"/>
+        </a:solidFill>
+        <a:round/>
+      </a:ln>
+    </cs:spPr>
+  </cs:dataPointWireframe>
+  <cs:dataTable>
+    <cs:lnRef idx="0"/>
+    <cs:fillRef idx="0"/>
+    <cs:effectRef idx="0"/>
+    <cs:fontRef idx="minor">
+      <a:schemeClr val="tx1">
+        <a:lumMod val="65000"/>
+        <a:lumOff val="35000"/>
+      </a:schemeClr>
+    </cs:fontRef>
+    <cs:spPr>
+      <a:noFill/>
+      <a:ln w="9525" cap="flat" cmpd="sng" algn="ctr">
+        <a:solidFill>
+          <a:schemeClr val="tx1">
+            <a:lumMod val="15000"/>
+            <a:lumOff val="85000"/>
+          </a:schemeClr>
+        </a:solidFill>
+        <a:round/>
+      </a:ln>
+    </cs:spPr>
+    <cs:defRPr sz="900" kern="1200"/>
+  </cs:dataTable>
+  <cs:downBar>
+    <cs:lnRef idx="0"/>
+    <cs:fillRef idx="0"/>
+    <cs:effectRef idx="0"/>
+    <cs:fontRef idx="minor">
+      <a:schemeClr val="tx1"/>
+    </cs:fontRef>
+    <cs:spPr>
+      <a:solidFill>
+        <a:schemeClr val="dk1">
+          <a:lumMod val="75000"/>
+          <a:lumOff val="25000"/>
+        </a:schemeClr>
+      </a:solidFill>
+      <a:ln w="9525" cap="flat" cmpd="sng" algn="ctr">
+        <a:solidFill>
+          <a:schemeClr val="tx1">
+            <a:lumMod val="65000"/>
+            <a:lumOff val="35000"/>
+          </a:schemeClr>
+        </a:solidFill>
+        <a:round/>
+      </a:ln>
+    </cs:spPr>
+  </cs:downBar>
+  <cs:dropLine>
+    <cs:lnRef idx="0"/>
+    <cs:fillRef idx="0"/>
+    <cs:effectRef idx="0"/>
+    <cs:fontRef idx="minor">
+      <a:schemeClr val="tx1"/>
+    </cs:fontRef>
+    <cs:spPr>
+      <a:ln w="9525" cap="flat" cmpd="sng" algn="ctr">
+        <a:solidFill>
+          <a:schemeClr val="tx1">
+            <a:lumMod val="35000"/>
+            <a:lumOff val="65000"/>
+          </a:schemeClr>
+        </a:solidFill>
+        <a:round/>
+      </a:ln>
+    </cs:spPr>
+  </cs:dropLine>
+  <cs:errorBar>
+    <cs:lnRef idx="0"/>
+    <cs:fillRef idx="0"/>
+    <cs:effectRef idx="0"/>
+    <cs:fontRef idx="minor">
+      <a:schemeClr val="tx1"/>
+    </cs:fontRef>
+    <cs:spPr>
+      <a:ln w="9525" cap="flat" cmpd="sng" algn="ctr">
+        <a:solidFill>
+          <a:schemeClr val="tx1">
+            <a:lumMod val="65000"/>
+            <a:lumOff val="35000"/>
+          </a:schemeClr>
+        </a:solidFill>
+        <a:round/>
+      </a:ln>
+    </cs:spPr>
+  </cs:errorBar>
+  <cs:floor>
+    <cs:lnRef idx="0"/>
+    <cs:fillRef idx="0"/>
+    <cs:effectRef idx="0"/>
+    <cs:fontRef idx="minor">
+      <a:schemeClr val="tx1"/>
+    </cs:fontRef>
+    <cs:spPr>
+      <a:noFill/>
+      <a:ln>
+        <a:noFill/>
+      </a:ln>
+    </cs:spPr>
+  </cs:floor>
+  <cs:gridlineMajor>
+    <cs:lnRef idx="0"/>
+    <cs:fillRef idx="0"/>
+    <cs:effectRef idx="0"/>
+    <cs:fontRef idx="minor">
+      <a:schemeClr val="tx1"/>
+    </cs:fontRef>
+    <cs:spPr>
+      <a:ln w="9525" cap="flat" cmpd="sng" algn="ctr">
+        <a:solidFill>
+          <a:schemeClr val="tx1">
+            <a:lumMod val="15000"/>
+            <a:lumOff val="85000"/>
+          </a:schemeClr>
+        </a:solidFill>
+        <a:round/>
+      </a:ln>
+    </cs:spPr>
+  </cs:gridlineMajor>
+  <cs:gridlineMinor>
+    <cs:lnRef idx="0"/>
+    <cs:fillRef idx="0"/>
+    <cs:effectRef idx="0"/>
+    <cs:fontRef idx="minor">
+      <a:schemeClr val="tx1"/>
+    </cs:fontRef>
+    <cs:spPr>
+      <a:ln w="9525" cap="flat" cmpd="sng" algn="ctr">
+        <a:solidFill>
+          <a:schemeClr val="tx1">
+            <a:lumMod val="5000"/>
+            <a:lumOff val="95000"/>
+          </a:schemeClr>
+        </a:solidFill>
+        <a:round/>
+      </a:ln>
+    </cs:spPr>
+  </cs:gridlineMinor>
+  <cs:hiLoLine>
+    <cs:lnRef idx="0"/>
+    <cs:fillRef idx="0"/>
+    <cs:effectRef idx="0"/>
+    <cs:fontRef idx="minor">
+      <a:schemeClr val="tx1"/>
+    </cs:fontRef>
+    <cs:spPr>
+      <a:ln w="9525" cap="flat" cmpd="sng" algn="ctr">
+        <a:solidFill>
+          <a:schemeClr val="tx1">
+            <a:lumMod val="50000"/>
+            <a:lumOff val="50000"/>
+          </a:schemeClr>
+        </a:solidFill>
+        <a:round/>
+      </a:ln>
+    </cs:spPr>
+  </cs:hiLoLine>
+  <cs:leaderLine>
+    <cs:lnRef idx="0"/>
+    <cs:fillRef idx="0"/>
+    <cs:effectRef idx="0"/>
+    <cs:fontRef idx="minor">
+      <a:schemeClr val="tx1"/>
+    </cs:fontRef>
+    <cs:spPr>
+      <a:ln w="9525" cap="flat" cmpd="sng" algn="ctr">
+        <a:solidFill>
+          <a:schemeClr val="tx1">
+            <a:lumMod val="35000"/>
+            <a:lumOff val="65000"/>
+          </a:schemeClr>
+        </a:solidFill>
+        <a:round/>
+      </a:ln>
+    </cs:spPr>
+  </cs:leaderLine>
+  <cs:legend>
+    <cs:lnRef idx="0"/>
+    <cs:fillRef idx="0"/>
+    <cs:effectRef idx="0"/>
+    <cs:fontRef idx="minor">
+      <a:schemeClr val="tx1">
+        <a:lumMod val="65000"/>
+        <a:lumOff val="35000"/>
+      </a:schemeClr>
+    </cs:fontRef>
+    <cs:defRPr sz="900" kern="1200"/>
+  </cs:legend>
+  <cs:plotArea mods="allowNoFillOverride allowNoLineOverride">
+    <cs:lnRef idx="0"/>
+    <cs:fillRef idx="0"/>
+    <cs:effectRef idx="0"/>
+    <cs:fontRef idx="minor">
+      <a:schemeClr val="tx1"/>
+    </cs:fontRef>
+  </cs:plotArea>
+  <cs:plotArea3D mods="allowNoFillOverride allowNoLineOverride">
+    <cs:lnRef idx="0"/>
+    <cs:fillRef idx="0"/>
+    <cs:effectRef idx="0"/>
+    <cs:fontRef idx="minor">
+      <a:schemeClr val="tx1"/>
+    </cs:fontRef>
+  </cs:plotArea3D>
+  <cs:seriesAxis>
+    <cs:lnRef idx="0"/>
+    <cs:fillRef idx="0"/>
+    <cs:effectRef idx="0"/>
+    <cs:fontRef idx="minor">
+      <a:schemeClr val="tx1">
+        <a:lumMod val="65000"/>
+        <a:lumOff val="35000"/>
+      </a:schemeClr>
+    </cs:fontRef>
+    <cs:defRPr sz="900" kern="1200"/>
+  </cs:seriesAxis>
+  <cs:seriesLine>
+    <cs:lnRef idx="0"/>
+    <cs:fillRef idx="0"/>
+    <cs:effectRef idx="0"/>
+    <cs:fontRef idx="minor">
+      <a:schemeClr val="tx1"/>
+    </cs:fontRef>
+    <cs:spPr>
+      <a:ln w="9525" cap="flat" cmpd="sng" algn="ctr">
+        <a:solidFill>
+          <a:schemeClr val="tx1">
+            <a:lumMod val="35000"/>
+            <a:lumOff val="65000"/>
+          </a:schemeClr>
+        </a:solidFill>
+        <a:round/>
+      </a:ln>
+    </cs:spPr>
+  </cs:seriesLine>
+  <cs:title>
+    <cs:lnRef idx="0"/>
+    <cs:fillRef idx="0"/>
+    <cs:effectRef idx="0"/>
+    <cs:fontRef idx="minor">
+      <a:schemeClr val="tx1">
+        <a:lumMod val="65000"/>
+        <a:lumOff val="35000"/>
+      </a:schemeClr>
+    </cs:fontRef>
+    <cs:defRPr sz="1400" b="0" kern="1200" spc="0" baseline="0"/>
+  </cs:title>
+  <cs:trendline>
+    <cs:lnRef idx="0">
+      <cs:styleClr val="auto"/>
+    </cs:lnRef>
+    <cs:fillRef idx="0"/>
+    <cs:effectRef idx="0"/>
+    <cs:fontRef idx="minor">
+      <a:schemeClr val="tx1"/>
+    </cs:fontRef>
+    <cs:spPr>
+      <a:ln w="19050" cap="rnd">
+        <a:solidFill>
+          <a:schemeClr val="phClr"/>
+        </a:solidFill>
+        <a:prstDash val="sysDot"/>
+      </a:ln>
+    </cs:spPr>
+  </cs:trendline>
+  <cs:trendlineLabel>
+    <cs:lnRef idx="0"/>
+    <cs:fillRef idx="0"/>
+    <cs:effectRef idx="0"/>
+    <cs:fontRef idx="minor">
+      <a:schemeClr val="tx1">
+        <a:lumMod val="65000"/>
+        <a:lumOff val="35000"/>
+      </a:schemeClr>
+    </cs:fontRef>
+    <cs:defRPr sz="900" kern="1200"/>
+  </cs:trendlineLabel>
+  <cs:upBar>
+    <cs:lnRef idx="0"/>
+    <cs:fillRef idx="0"/>
+    <cs:effectRef idx="0"/>
+    <cs:fontRef idx="minor">
+      <a:schemeClr val="tx1"/>
+    </cs:fontRef>
+    <cs:spPr>
+      <a:solidFill>
+        <a:schemeClr val="lt1"/>
+      </a:solidFill>
+      <a:ln w="9525" cap="flat" cmpd="sng" algn="ctr">
+        <a:solidFill>
+          <a:schemeClr val="tx1">
+            <a:lumMod val="65000"/>
+            <a:lumOff val="35000"/>
+          </a:schemeClr>
+        </a:solidFill>
+        <a:round/>
+      </a:ln>
+    </cs:spPr>
+  </cs:upBar>
+  <cs:valueAxis>
+    <cs:lnRef idx="0"/>
+    <cs:fillRef idx="0"/>
+    <cs:effectRef idx="0"/>
+    <cs:fontRef idx="minor">
+      <a:schemeClr val="tx1">
+        <a:lumMod val="65000"/>
+        <a:lumOff val="35000"/>
+      </a:schemeClr>
+    </cs:fontRef>
+    <cs:defRPr sz="900" kern="1200"/>
+  </cs:valueAxis>
+  <cs:wall>
+    <cs:lnRef idx="0"/>
+    <cs:fillRef idx="0"/>
+    <cs:effectRef idx="0"/>
+    <cs:fontRef idx="minor">
+      <a:schemeClr val="tx1"/>
+    </cs:fontRef>
+    <cs:spPr>
+      <a:noFill/>
+      <a:ln>
+        <a:noFill/>
+      </a:ln>
+    </cs:spPr>
+  </cs:wall>
+</cs:chartStyle>
 </file>
 
 <file path=ppt/notesMasters/notesMaster1.xml><?xml version="1.0" encoding="utf-8"?>
@@ -8006,7 +9909,12 @@
             <p:ph type="ctrTitle"/>
           </p:nvPr>
         </p:nvSpPr>
-        <p:spPr/>
+        <p:spPr>
+          <a:xfrm>
+            <a:off x="812801" y="872067"/>
+            <a:ext cx="11379199" cy="2262781"/>
+          </a:xfrm>
+        </p:spPr>
         <p:txBody>
           <a:bodyPr/>
           <a:lstStyle/>
@@ -8028,12 +9936,31 @@
             <p:ph type="subTitle" idx="1"/>
           </p:nvPr>
         </p:nvSpPr>
-        <p:spPr/>
+        <p:spPr>
+          <a:xfrm>
+            <a:off x="6907213" y="3778312"/>
+            <a:ext cx="8915399" cy="1126283"/>
+          </a:xfrm>
+        </p:spPr>
         <p:txBody>
           <a:bodyPr/>
           <a:lstStyle/>
           <a:p>
-            <a:endParaRPr lang="en-US"/>
+            <a:pPr marL="285750" indent="-285750">
+              <a:buFontTx/>
+              <a:buChar char="-"/>
+            </a:pPr>
+            <a:r>
+              <a:rPr lang="en-US" dirty="0" smtClean="0"/>
+              <a:t>Amish Shah</a:t>
+            </a:r>
+          </a:p>
+          <a:p>
+            <a:pPr marL="285750" indent="-285750">
+              <a:buFontTx/>
+              <a:buChar char="-"/>
+            </a:pPr>
+            <a:endParaRPr lang="en-US" dirty="0"/>
           </a:p>
         </p:txBody>
       </p:sp>
@@ -8755,7 +10682,12 @@
             <p:ph idx="1"/>
           </p:nvPr>
         </p:nvSpPr>
-        <p:spPr/>
+        <p:spPr>
+          <a:xfrm>
+            <a:off x="2138108" y="1780032"/>
+            <a:ext cx="8915400" cy="3777622"/>
+          </a:xfrm>
+        </p:spPr>
         <p:txBody>
           <a:bodyPr/>
           <a:lstStyle/>
@@ -9591,7 +11523,7 @@
           <a:blip r:embed="rId2">
             <a:extLst>
               <a:ext uri="{96DAC541-7B7A-43D3-8B79-37D633B846F1}">
-                <asvg:svgBlip xmlns="" xmlns:asvg="http://schemas.microsoft.com/office/drawing/2016/SVG/main" r:embed="rId3"/>
+                <asvg:svgBlip xmlns:asvg="http://schemas.microsoft.com/office/drawing/2016/SVG/main" xmlns="" r:embed="rId3"/>
               </a:ext>
             </a:extLst>
           </a:blip>
@@ -10314,8 +12246,13 @@
             </a:r>
             <a:r>
               <a:rPr lang="en-US" dirty="0" smtClean="0"/>
-              <a:t> Necessity using VPC.</a:t>
-            </a:r>
+              <a:t> Necessity using VPC</a:t>
+            </a:r>
+            <a:r>
+              <a:rPr lang="en-US" dirty="0" smtClean="0"/>
+              <a:t>.</a:t>
+            </a:r>
+            <a:endParaRPr lang="en-US" dirty="0" smtClean="0"/>
           </a:p>
           <a:p>
             <a:r>
@@ -10712,7 +12649,12 @@
             <p:ph type="title"/>
           </p:nvPr>
         </p:nvSpPr>
-        <p:spPr/>
+        <p:spPr>
+          <a:xfrm>
+            <a:off x="1953761" y="344710"/>
+            <a:ext cx="8911687" cy="1280890"/>
+          </a:xfrm>
+        </p:spPr>
         <p:txBody>
           <a:bodyPr/>
           <a:lstStyle/>
@@ -10726,25 +12668,30 @@
           </a:p>
         </p:txBody>
       </p:sp>
-      <p:sp>
-        <p:nvSpPr>
-          <p:cNvPr id="3" name="Content Placeholder 2"/>
-          <p:cNvSpPr>
-            <a:spLocks noGrp="1"/>
-          </p:cNvSpPr>
+      <p:graphicFrame>
+        <p:nvGraphicFramePr>
+          <p:cNvPr id="4" name="Chart 3"/>
+          <p:cNvGraphicFramePr>
+            <a:graphicFrameLocks/>
+          </p:cNvGraphicFramePr>
           <p:nvPr>
-            <p:ph idx="1"/>
+            <p:extLst>
+              <p:ext uri="{D42A27DB-BD31-4B8C-83A1-F6EECF244321}">
+                <p14:modId xmlns:p14="http://schemas.microsoft.com/office/powerpoint/2010/main" val="2766821089"/>
+              </p:ext>
+            </p:extLst>
           </p:nvPr>
-        </p:nvSpPr>
-        <p:spPr/>
-        <p:txBody>
-          <a:bodyPr/>
-          <a:lstStyle/>
-          <a:p>
-            <a:endParaRPr lang="en-US" dirty="0"/>
-          </a:p>
-        </p:txBody>
-      </p:sp>
+        </p:nvGraphicFramePr>
+        <p:xfrm>
+          <a:off x="1337733" y="1490133"/>
+          <a:ext cx="10634809" cy="4758267"/>
+        </p:xfrm>
+        <a:graphic>
+          <a:graphicData uri="http://schemas.openxmlformats.org/drawingml/2006/chart">
+            <c:chart xmlns:c="http://schemas.openxmlformats.org/drawingml/2006/chart" xmlns:r="http://schemas.openxmlformats.org/officeDocument/2006/relationships" r:id="rId2"/>
+          </a:graphicData>
+        </a:graphic>
+      </p:graphicFrame>
     </p:spTree>
     <p:extLst>
       <p:ext uri="{BB962C8B-B14F-4D97-AF65-F5344CB8AC3E}">
@@ -10785,7 +12732,12 @@
             <p:ph type="title"/>
           </p:nvPr>
         </p:nvSpPr>
-        <p:spPr/>
+        <p:spPr>
+          <a:xfrm>
+            <a:off x="1864792" y="522510"/>
+            <a:ext cx="8911687" cy="1280890"/>
+          </a:xfrm>
+        </p:spPr>
         <p:txBody>
           <a:bodyPr/>
           <a:lstStyle/>
@@ -10793,60 +12745,47 @@
             <a:pPr algn="ctr"/>
             <a:r>
               <a:rPr lang="en-US" dirty="0" smtClean="0"/>
-              <a:t>Limitations</a:t>
+              <a:t>Results – Procrastinated vs </a:t>
+            </a:r>
+            <a:br>
+              <a:rPr lang="en-US" dirty="0" smtClean="0"/>
+            </a:br>
+            <a:r>
+              <a:rPr lang="en-US" dirty="0" smtClean="0"/>
+              <a:t>Non Procrastinated</a:t>
             </a:r>
             <a:endParaRPr lang="en-US" dirty="0"/>
           </a:p>
         </p:txBody>
       </p:sp>
-      <p:sp>
-        <p:nvSpPr>
-          <p:cNvPr id="3" name="Content Placeholder 2"/>
-          <p:cNvSpPr>
-            <a:spLocks noGrp="1"/>
-          </p:cNvSpPr>
+      <p:graphicFrame>
+        <p:nvGraphicFramePr>
+          <p:cNvPr id="5" name="Chart 4"/>
+          <p:cNvGraphicFramePr>
+            <a:graphicFrameLocks/>
+          </p:cNvGraphicFramePr>
           <p:nvPr>
-            <p:ph idx="1"/>
+            <p:extLst>
+              <p:ext uri="{D42A27DB-BD31-4B8C-83A1-F6EECF244321}">
+                <p14:modId xmlns:p14="http://schemas.microsoft.com/office/powerpoint/2010/main" val="1324968578"/>
+              </p:ext>
+            </p:extLst>
           </p:nvPr>
-        </p:nvSpPr>
-        <p:spPr/>
-        <p:txBody>
-          <a:bodyPr/>
-          <a:lstStyle/>
-          <a:p>
-            <a:r>
-              <a:rPr lang="en-US" dirty="0" smtClean="0"/>
-              <a:t>Limited to one pattern only. </a:t>
-            </a:r>
-            <a:endParaRPr lang="en-US" dirty="0"/>
-          </a:p>
-          <a:p>
-            <a:r>
-              <a:rPr lang="en-US" dirty="0" smtClean="0"/>
-              <a:t>Limited to Java source code analysis rather than bytecode</a:t>
-            </a:r>
-          </a:p>
-          <a:p>
-            <a:r>
-              <a:rPr lang="en-US" dirty="0" smtClean="0"/>
-              <a:t>Not yet tested on Post data.</a:t>
-            </a:r>
-          </a:p>
-          <a:p>
-            <a:r>
-              <a:rPr lang="en-US" dirty="0" smtClean="0"/>
-              <a:t>Instrumentation process requires some developer involvement.</a:t>
-            </a:r>
-          </a:p>
-          <a:p>
-            <a:endParaRPr lang="en-US" dirty="0"/>
-          </a:p>
-        </p:txBody>
-      </p:sp>
+        </p:nvGraphicFramePr>
+        <p:xfrm>
+          <a:off x="2590802" y="1803400"/>
+          <a:ext cx="7823200" cy="4030134"/>
+        </p:xfrm>
+        <a:graphic>
+          <a:graphicData uri="http://schemas.openxmlformats.org/drawingml/2006/chart">
+            <c:chart xmlns:c="http://schemas.openxmlformats.org/drawingml/2006/chart" xmlns:r="http://schemas.openxmlformats.org/officeDocument/2006/relationships" r:id="rId2"/>
+          </a:graphicData>
+        </a:graphic>
+      </p:graphicFrame>
     </p:spTree>
     <p:extLst>
       <p:ext uri="{BB962C8B-B14F-4D97-AF65-F5344CB8AC3E}">
-        <p14:creationId xmlns:p14="http://schemas.microsoft.com/office/powerpoint/2010/main" val="1095983116"/>
+        <p14:creationId xmlns:p14="http://schemas.microsoft.com/office/powerpoint/2010/main" val="1427784178"/>
       </p:ext>
     </p:extLst>
   </p:cSld>
@@ -11174,9 +13113,10 @@
           <a:bodyPr/>
           <a:lstStyle/>
           <a:p>
+            <a:pPr algn="ctr"/>
             <a:r>
               <a:rPr lang="en-US" dirty="0" smtClean="0"/>
-              <a:t>Potential Future Work</a:t>
+              <a:t>Results Summary</a:t>
             </a:r>
             <a:endParaRPr lang="en-US" dirty="0"/>
           </a:p>
@@ -11199,36 +13139,37 @@
           <a:p>
             <a:r>
               <a:rPr lang="en-US" dirty="0" smtClean="0"/>
-              <a:t>Implement for POST based pre-fetch.</a:t>
+              <a:t>Comparing User 4 to User 1 yields 27% savings in data</a:t>
             </a:r>
           </a:p>
           <a:p>
             <a:r>
               <a:rPr lang="en-US" dirty="0" smtClean="0"/>
-              <a:t>Analyze at Byte Code level</a:t>
+              <a:t>Comparing User 3 to User 1 yields 41% savings in data</a:t>
             </a:r>
           </a:p>
           <a:p>
             <a:r>
               <a:rPr lang="en-US" dirty="0" smtClean="0"/>
-              <a:t>Identify more patterns</a:t>
-            </a:r>
+              <a:t>User 4 VPC &gt; User 3 VPC. Hence User 4 consumes more data.</a:t>
+            </a:r>
+            <a:endParaRPr lang="en-US" dirty="0"/>
           </a:p>
           <a:p>
             <a:r>
               <a:rPr lang="en-US" dirty="0" smtClean="0"/>
-              <a:t>Test on more applications.</a:t>
-            </a:r>
-          </a:p>
-          <a:p>
-            <a:endParaRPr lang="en-US" dirty="0"/>
+              <a:t>Mean Saving of 34%</a:t>
+            </a:r>
+          </a:p>
+          <a:p>
+            <a:endParaRPr lang="en-US" dirty="0" smtClean="0"/>
           </a:p>
         </p:txBody>
       </p:sp>
     </p:spTree>
     <p:extLst>
       <p:ext uri="{BB962C8B-B14F-4D97-AF65-F5344CB8AC3E}">
-        <p14:creationId xmlns:p14="http://schemas.microsoft.com/office/powerpoint/2010/main" val="1045082269"/>
+        <p14:creationId xmlns:p14="http://schemas.microsoft.com/office/powerpoint/2010/main" val="1286010416"/>
       </p:ext>
     </p:extLst>
   </p:cSld>
@@ -11265,22 +13206,17 @@
             <p:ph type="title"/>
           </p:nvPr>
         </p:nvSpPr>
-        <p:spPr>
-          <a:xfrm>
-            <a:off x="2592925" y="624110"/>
-            <a:ext cx="8911687" cy="617392"/>
-          </a:xfrm>
-        </p:spPr>
-        <p:txBody>
-          <a:bodyPr>
-            <a:normAutofit fontScale="90000"/>
-          </a:bodyPr>
+        <p:spPr/>
+        <p:txBody>
+          <a:bodyPr/>
           <a:lstStyle/>
           <a:p>
-            <a:r>
-              <a:rPr lang="en-US" dirty="0"/>
-              <a:t>Conclusion</a:t>
-            </a:r>
+            <a:pPr algn="ctr"/>
+            <a:r>
+              <a:rPr lang="en-US" dirty="0" smtClean="0"/>
+              <a:t>Limitations</a:t>
+            </a:r>
+            <a:endParaRPr lang="en-US" dirty="0"/>
           </a:p>
         </p:txBody>
       </p:sp>
@@ -11294,51 +13230,140 @@
             <p:ph idx="1"/>
           </p:nvPr>
         </p:nvSpPr>
-        <p:spPr>
-          <a:xfrm>
-            <a:off x="2589212" y="1241502"/>
-            <a:ext cx="8915400" cy="4669720"/>
-          </a:xfrm>
-        </p:spPr>
+        <p:spPr/>
         <p:txBody>
           <a:bodyPr/>
           <a:lstStyle/>
           <a:p>
             <a:r>
-              <a:rPr lang="en-US" dirty="0"/>
-              <a:t>This work definitely suggests that there is some scope tracking user movements and using it for procrastination</a:t>
-            </a:r>
-          </a:p>
-          <a:p>
-            <a:r>
-              <a:rPr lang="en-US" dirty="0"/>
-              <a:t>(Insert some key results)</a:t>
-            </a:r>
-          </a:p>
-          <a:p>
-            <a:r>
-              <a:rPr lang="en-US" dirty="0"/>
-              <a:t>With our design, it is possible to procrastinate HTTP POST method</a:t>
-            </a:r>
-          </a:p>
-          <a:p>
-            <a:r>
-              <a:rPr lang="en-US" dirty="0"/>
-              <a:t>Bytecode instrumentation would make the static analysis more generalized</a:t>
-            </a:r>
-          </a:p>
-          <a:p>
-            <a:r>
-              <a:rPr lang="en-US" dirty="0"/>
-              <a:t>In this work, we are targeting a fundamental network design in Android, hence with minor modification it should work with various network libraries.</a:t>
-            </a:r>
+              <a:rPr lang="en-US" dirty="0" smtClean="0"/>
+              <a:t>Limited to one pattern only. </a:t>
+            </a:r>
+            <a:endParaRPr lang="en-US" dirty="0"/>
+          </a:p>
+          <a:p>
+            <a:r>
+              <a:rPr lang="en-US" dirty="0" smtClean="0"/>
+              <a:t>Limited to Java source code analysis rather than bytecode</a:t>
+            </a:r>
+          </a:p>
+          <a:p>
+            <a:r>
+              <a:rPr lang="en-US" dirty="0" smtClean="0"/>
+              <a:t>Not yet tested on Post data.</a:t>
+            </a:r>
+          </a:p>
+          <a:p>
+            <a:r>
+              <a:rPr lang="en-US" dirty="0" smtClean="0"/>
+              <a:t>Instrumentation process requires some developer involvement.</a:t>
+            </a:r>
+          </a:p>
+          <a:p>
+            <a:endParaRPr lang="en-US" dirty="0"/>
           </a:p>
         </p:txBody>
       </p:sp>
     </p:spTree>
     <p:extLst>
       <p:ext uri="{BB962C8B-B14F-4D97-AF65-F5344CB8AC3E}">
-        <p14:creationId xmlns:p14="http://schemas.microsoft.com/office/powerpoint/2010/main" val="287513918"/>
+        <p14:creationId xmlns:p14="http://schemas.microsoft.com/office/powerpoint/2010/main" val="1095983116"/>
+      </p:ext>
+    </p:extLst>
+  </p:cSld>
+  <p:clrMapOvr>
+    <a:masterClrMapping/>
+  </p:clrMapOvr>
+</p:sld>
+</file>
+
+<file path=ppt/slides/slide22.xml><?xml version="1.0" encoding="utf-8"?>
+<p:sld xmlns:a="http://schemas.openxmlformats.org/drawingml/2006/main" xmlns:r="http://schemas.openxmlformats.org/officeDocument/2006/relationships" xmlns:p="http://schemas.openxmlformats.org/presentationml/2006/main">
+  <p:cSld>
+    <p:spTree>
+      <p:nvGrpSpPr>
+        <p:cNvPr id="1" name=""/>
+        <p:cNvGrpSpPr/>
+        <p:nvPr/>
+      </p:nvGrpSpPr>
+      <p:grpSpPr>
+        <a:xfrm>
+          <a:off x="0" y="0"/>
+          <a:ext cx="0" cy="0"/>
+          <a:chOff x="0" y="0"/>
+          <a:chExt cx="0" cy="0"/>
+        </a:xfrm>
+      </p:grpSpPr>
+      <p:sp>
+        <p:nvSpPr>
+          <p:cNvPr id="2" name="Title 1"/>
+          <p:cNvSpPr>
+            <a:spLocks noGrp="1"/>
+          </p:cNvSpPr>
+          <p:nvPr>
+            <p:ph type="title"/>
+          </p:nvPr>
+        </p:nvSpPr>
+        <p:spPr/>
+        <p:txBody>
+          <a:bodyPr/>
+          <a:lstStyle/>
+          <a:p>
+            <a:r>
+              <a:rPr lang="en-US" dirty="0" smtClean="0"/>
+              <a:t>Potential Future Work</a:t>
+            </a:r>
+            <a:endParaRPr lang="en-US" dirty="0"/>
+          </a:p>
+        </p:txBody>
+      </p:sp>
+      <p:sp>
+        <p:nvSpPr>
+          <p:cNvPr id="3" name="Content Placeholder 2"/>
+          <p:cNvSpPr>
+            <a:spLocks noGrp="1"/>
+          </p:cNvSpPr>
+          <p:nvPr>
+            <p:ph idx="1"/>
+          </p:nvPr>
+        </p:nvSpPr>
+        <p:spPr/>
+        <p:txBody>
+          <a:bodyPr/>
+          <a:lstStyle/>
+          <a:p>
+            <a:r>
+              <a:rPr lang="en-US" dirty="0" smtClean="0"/>
+              <a:t>Implement for POST based pre-fetch.</a:t>
+            </a:r>
+          </a:p>
+          <a:p>
+            <a:r>
+              <a:rPr lang="en-US" dirty="0" smtClean="0"/>
+              <a:t>Analyze at Byte Code level</a:t>
+            </a:r>
+          </a:p>
+          <a:p>
+            <a:r>
+              <a:rPr lang="en-US" dirty="0" smtClean="0"/>
+              <a:t>Identify more patterns</a:t>
+            </a:r>
+          </a:p>
+          <a:p>
+            <a:r>
+              <a:rPr lang="en-US" dirty="0" smtClean="0"/>
+              <a:t>Test on more applications.</a:t>
+            </a:r>
+          </a:p>
+          <a:p>
+            <a:endParaRPr lang="en-US" dirty="0"/>
+          </a:p>
+        </p:txBody>
+      </p:sp>
+    </p:spTree>
+    <p:extLst>
+      <p:ext uri="{BB962C8B-B14F-4D97-AF65-F5344CB8AC3E}">
+        <p14:creationId xmlns:p14="http://schemas.microsoft.com/office/powerpoint/2010/main" val="1045082269"/>
       </p:ext>
     </p:extLst>
   </p:cSld>

</xml_diff>

<commit_message>
Edit static analysis content and font changes in ppt
</commit_message>
<xml_diff>
--- a/Prefetch Procrastinator Final Presentation.pptx
+++ b/Prefetch Procrastinator Final Presentation.pptx
@@ -5,7 +5,7 @@
     <p:sldMasterId id="2147483648" r:id="rId1"/>
   </p:sldMasterIdLst>
   <p:notesMasterIdLst>
-    <p:notesMasterId r:id="rId24"/>
+    <p:notesMasterId r:id="rId23"/>
   </p:notesMasterIdLst>
   <p:sldIdLst>
     <p:sldId id="256" r:id="rId2"/>
@@ -18,18 +18,17 @@
     <p:sldId id="277" r:id="rId9"/>
     <p:sldId id="258" r:id="rId10"/>
     <p:sldId id="259" r:id="rId11"/>
-    <p:sldId id="260" r:id="rId12"/>
-    <p:sldId id="261" r:id="rId13"/>
-    <p:sldId id="262" r:id="rId14"/>
-    <p:sldId id="263" r:id="rId15"/>
-    <p:sldId id="264" r:id="rId16"/>
-    <p:sldId id="268" r:id="rId17"/>
-    <p:sldId id="265" r:id="rId18"/>
-    <p:sldId id="267" r:id="rId19"/>
-    <p:sldId id="278" r:id="rId20"/>
-    <p:sldId id="279" r:id="rId21"/>
-    <p:sldId id="269" r:id="rId22"/>
-    <p:sldId id="270" r:id="rId23"/>
+    <p:sldId id="261" r:id="rId12"/>
+    <p:sldId id="262" r:id="rId13"/>
+    <p:sldId id="263" r:id="rId14"/>
+    <p:sldId id="264" r:id="rId15"/>
+    <p:sldId id="268" r:id="rId16"/>
+    <p:sldId id="265" r:id="rId17"/>
+    <p:sldId id="267" r:id="rId18"/>
+    <p:sldId id="278" r:id="rId19"/>
+    <p:sldId id="279" r:id="rId20"/>
+    <p:sldId id="269" r:id="rId21"/>
+    <p:sldId id="270" r:id="rId22"/>
   </p:sldIdLst>
   <p:sldSz cx="12192000" cy="6858000"/>
   <p:notesSz cx="6858000" cy="9144000"/>
@@ -137,7 +136,7 @@
 </file>
 
 <file path=ppt/charts/chart1.xml><?xml version="1.0" encoding="utf-8"?>
-<c:chartSpace xmlns:c="http://schemas.openxmlformats.org/drawingml/2006/chart" xmlns:a="http://schemas.openxmlformats.org/drawingml/2006/main" xmlns:r="http://schemas.openxmlformats.org/officeDocument/2006/relationships">
+<c:chartSpace xmlns:c="http://schemas.openxmlformats.org/drawingml/2006/chart" xmlns:a="http://schemas.openxmlformats.org/drawingml/2006/main" xmlns:r="http://schemas.openxmlformats.org/officeDocument/2006/relationships" xmlns:c16r2="http://schemas.microsoft.com/office/drawing/2015/06/chart">
   <c:date1904 val="0"/>
   <c:lang val="en-US"/>
   <c:roundedCorners val="0"/>
@@ -177,7 +176,6 @@
           </a:p>
         </c:rich>
       </c:tx>
-      <c:layout/>
       <c:overlay val="0"/>
       <c:spPr>
         <a:noFill/>
@@ -281,7 +279,6 @@
             <c:showLeaderLines val="0"/>
             <c:extLst>
               <c:ext xmlns:c15="http://schemas.microsoft.com/office/drawing/2012/chart" uri="{CE6537A1-D6FC-4f65-9D91-7224C49458BB}">
-                <c15:layout/>
                 <c15:showLeaderLines val="1"/>
                 <c15:leaderLines>
                   <c:spPr>
@@ -340,6 +337,11 @@
               </c:numCache>
             </c:numRef>
           </c:val>
+          <c:extLst>
+            <c:ext xmlns:c16="http://schemas.microsoft.com/office/drawing/2014/chart" uri="{C3380CC4-5D6E-409C-BE32-E72D297353CC}">
+              <c16:uniqueId val="{00000000-6171-4D23-BFC1-D5EA7F332D2D}"/>
+            </c:ext>
+          </c:extLst>
         </c:ser>
         <c:dLbls>
           <c:dLblPos val="inEnd"/>
@@ -473,7 +475,7 @@
 </file>
 
 <file path=ppt/charts/chart2.xml><?xml version="1.0" encoding="utf-8"?>
-<c:chartSpace xmlns:c="http://schemas.openxmlformats.org/drawingml/2006/chart" xmlns:a="http://schemas.openxmlformats.org/drawingml/2006/main" xmlns:r="http://schemas.openxmlformats.org/officeDocument/2006/relationships">
+<c:chartSpace xmlns:c="http://schemas.openxmlformats.org/drawingml/2006/chart" xmlns:a="http://schemas.openxmlformats.org/drawingml/2006/main" xmlns:r="http://schemas.openxmlformats.org/officeDocument/2006/relationships" xmlns:c16r2="http://schemas.microsoft.com/office/drawing/2015/06/chart">
   <c:date1904 val="0"/>
   <c:lang val="en-US"/>
   <c:roundedCorners val="0"/>
@@ -512,13 +514,12 @@
           </a:p>
           <a:p>
             <a:pPr>
-              <a:defRPr sz="1500" baseline="0"/>
+              <a:defRPr sz="1500"/>
             </a:pPr>
             <a:endParaRPr lang="en-US" sz="1500" baseline="0"/>
           </a:p>
         </c:rich>
       </c:tx>
-      <c:layout/>
       <c:overlay val="0"/>
       <c:spPr>
         <a:noFill/>
@@ -584,6 +585,11 @@
               </a:ln>
               <a:effectLst/>
             </c:spPr>
+            <c:extLst>
+              <c:ext xmlns:c16="http://schemas.microsoft.com/office/drawing/2014/chart" uri="{C3380CC4-5D6E-409C-BE32-E72D297353CC}">
+                <c16:uniqueId val="{00000001-5090-4B98-BEFE-183D2A930987}"/>
+              </c:ext>
+            </c:extLst>
           </c:dPt>
           <c:dPt>
             <c:idx val="3"/>
@@ -598,6 +604,11 @@
               </a:ln>
               <a:effectLst/>
             </c:spPr>
+            <c:extLst>
+              <c:ext xmlns:c16="http://schemas.microsoft.com/office/drawing/2014/chart" uri="{C3380CC4-5D6E-409C-BE32-E72D297353CC}">
+                <c16:uniqueId val="{00000003-5090-4B98-BEFE-183D2A930987}"/>
+              </c:ext>
+            </c:extLst>
           </c:dPt>
           <c:cat>
             <c:strRef>
@@ -640,6 +651,11 @@
               </c:numCache>
             </c:numRef>
           </c:val>
+          <c:extLst>
+            <c:ext xmlns:c16="http://schemas.microsoft.com/office/drawing/2014/chart" uri="{C3380CC4-5D6E-409C-BE32-E72D297353CC}">
+              <c16:uniqueId val="{00000004-5090-4B98-BEFE-183D2A930987}"/>
+            </c:ext>
+          </c:extLst>
         </c:ser>
         <c:ser>
           <c:idx val="1"/>
@@ -698,6 +714,11 @@
               </c:numCache>
             </c:numRef>
           </c:val>
+          <c:extLst>
+            <c:ext xmlns:c16="http://schemas.microsoft.com/office/drawing/2014/chart" uri="{C3380CC4-5D6E-409C-BE32-E72D297353CC}">
+              <c16:uniqueId val="{00000005-5090-4B98-BEFE-183D2A930987}"/>
+            </c:ext>
+          </c:extLst>
         </c:ser>
         <c:dLbls>
           <c:showLegendKey val="0"/>
@@ -829,7 +850,6 @@
     </c:plotArea>
     <c:legend>
       <c:legendPos val="b"/>
-      <c:layout/>
       <c:overlay val="0"/>
       <c:spPr>
         <a:noFill/>
@@ -2120,7 +2140,7 @@
           <a:p>
             <a:fld id="{2B8E1E21-45E6-4945-8842-19E4118D8FA0}" type="datetimeFigureOut">
               <a:rPr lang="en-US" smtClean="0"/>
-              <a:t>4/20/2017</a:t>
+              <a:t>4/23/2017</a:t>
             </a:fld>
             <a:endParaRPr lang="en-US"/>
           </a:p>
@@ -2576,7 +2596,7 @@
             <a:fld id="{B61BEF0D-F0BB-DE4B-95CE-6DB70DBA9567}" type="datetimeFigureOut">
               <a:rPr lang="en-US" dirty="0"/>
               <a:pPr/>
-              <a:t>4/20/2017</a:t>
+              <a:t>4/23/2017</a:t>
             </a:fld>
             <a:endParaRPr lang="en-US" dirty="0"/>
           </a:p>
@@ -2911,7 +2931,7 @@
             <a:fld id="{B61BEF0D-F0BB-DE4B-95CE-6DB70DBA9567}" type="datetimeFigureOut">
               <a:rPr lang="en-US" dirty="0"/>
               <a:pPr/>
-              <a:t>4/20/2017</a:t>
+              <a:t>4/23/2017</a:t>
             </a:fld>
             <a:endParaRPr lang="en-US" dirty="0"/>
           </a:p>
@@ -3309,7 +3329,7 @@
             <a:fld id="{B61BEF0D-F0BB-DE4B-95CE-6DB70DBA9567}" type="datetimeFigureOut">
               <a:rPr lang="en-US" dirty="0"/>
               <a:pPr/>
-              <a:t>4/20/2017</a:t>
+              <a:t>4/23/2017</a:t>
             </a:fld>
             <a:endParaRPr lang="en-US" dirty="0"/>
           </a:p>
@@ -3642,7 +3662,7 @@
             <a:fld id="{B61BEF0D-F0BB-DE4B-95CE-6DB70DBA9567}" type="datetimeFigureOut">
               <a:rPr lang="en-US" dirty="0"/>
               <a:pPr/>
-              <a:t>4/20/2017</a:t>
+              <a:t>4/23/2017</a:t>
             </a:fld>
             <a:endParaRPr lang="en-US" dirty="0"/>
           </a:p>
@@ -3959,7 +3979,7 @@
             <a:fld id="{B61BEF0D-F0BB-DE4B-95CE-6DB70DBA9567}" type="datetimeFigureOut">
               <a:rPr lang="en-US" dirty="0"/>
               <a:pPr/>
-              <a:t>4/20/2017</a:t>
+              <a:t>4/23/2017</a:t>
             </a:fld>
             <a:endParaRPr lang="en-US" dirty="0"/>
           </a:p>
@@ -4352,7 +4372,7 @@
             <a:fld id="{B61BEF0D-F0BB-DE4B-95CE-6DB70DBA9567}" type="datetimeFigureOut">
               <a:rPr lang="en-US" dirty="0"/>
               <a:pPr/>
-              <a:t>4/20/2017</a:t>
+              <a:t>4/23/2017</a:t>
             </a:fld>
             <a:endParaRPr lang="en-US" dirty="0"/>
           </a:p>
@@ -4606,7 +4626,7 @@
             <a:fld id="{B61BEF0D-F0BB-DE4B-95CE-6DB70DBA9567}" type="datetimeFigureOut">
               <a:rPr lang="en-US" dirty="0"/>
               <a:pPr/>
-              <a:t>4/20/2017</a:t>
+              <a:t>4/23/2017</a:t>
             </a:fld>
             <a:endParaRPr lang="en-US" dirty="0"/>
           </a:p>
@@ -4865,7 +4885,7 @@
             <a:fld id="{B61BEF0D-F0BB-DE4B-95CE-6DB70DBA9567}" type="datetimeFigureOut">
               <a:rPr lang="en-US" dirty="0"/>
               <a:pPr/>
-              <a:t>4/20/2017</a:t>
+              <a:t>4/23/2017</a:t>
             </a:fld>
             <a:endParaRPr lang="en-US" dirty="0"/>
           </a:p>
@@ -5124,7 +5144,7 @@
             <a:fld id="{B61BEF0D-F0BB-DE4B-95CE-6DB70DBA9567}" type="datetimeFigureOut">
               <a:rPr lang="en-US" dirty="0"/>
               <a:pPr/>
-              <a:t>4/20/2017</a:t>
+              <a:t>4/23/2017</a:t>
             </a:fld>
             <a:endParaRPr lang="en-US" dirty="0"/>
           </a:p>
@@ -5450,7 +5470,7 @@
             <a:fld id="{B61BEF0D-F0BB-DE4B-95CE-6DB70DBA9567}" type="datetimeFigureOut">
               <a:rPr lang="en-US" dirty="0"/>
               <a:pPr/>
-              <a:t>4/20/2017</a:t>
+              <a:t>4/23/2017</a:t>
             </a:fld>
             <a:endParaRPr lang="en-US" dirty="0"/>
           </a:p>
@@ -5770,7 +5790,7 @@
             <a:fld id="{B61BEF0D-F0BB-DE4B-95CE-6DB70DBA9567}" type="datetimeFigureOut">
               <a:rPr lang="en-US" dirty="0"/>
               <a:pPr/>
-              <a:t>4/20/2017</a:t>
+              <a:t>4/23/2017</a:t>
             </a:fld>
             <a:endParaRPr lang="en-US" dirty="0"/>
           </a:p>
@@ -6224,7 +6244,7 @@
             <a:fld id="{B61BEF0D-F0BB-DE4B-95CE-6DB70DBA9567}" type="datetimeFigureOut">
               <a:rPr lang="en-US" dirty="0"/>
               <a:pPr/>
-              <a:t>4/20/2017</a:t>
+              <a:t>4/23/2017</a:t>
             </a:fld>
             <a:endParaRPr lang="en-US" dirty="0"/>
           </a:p>
@@ -6426,7 +6446,7 @@
             <a:fld id="{B61BEF0D-F0BB-DE4B-95CE-6DB70DBA9567}" type="datetimeFigureOut">
               <a:rPr lang="en-US" dirty="0"/>
               <a:pPr/>
-              <a:t>4/20/2017</a:t>
+              <a:t>4/23/2017</a:t>
             </a:fld>
             <a:endParaRPr lang="en-US" dirty="0"/>
           </a:p>
@@ -6600,7 +6620,7 @@
             <a:fld id="{B61BEF0D-F0BB-DE4B-95CE-6DB70DBA9567}" type="datetimeFigureOut">
               <a:rPr lang="en-US" dirty="0"/>
               <a:pPr/>
-              <a:t>4/20/2017</a:t>
+              <a:t>4/23/2017</a:t>
             </a:fld>
             <a:endParaRPr lang="en-US" dirty="0"/>
           </a:p>
@@ -6930,7 +6950,7 @@
             <a:fld id="{B61BEF0D-F0BB-DE4B-95CE-6DB70DBA9567}" type="datetimeFigureOut">
               <a:rPr lang="en-US" dirty="0"/>
               <a:pPr/>
-              <a:t>4/20/2017</a:t>
+              <a:t>4/23/2017</a:t>
             </a:fld>
             <a:endParaRPr lang="en-US" dirty="0"/>
           </a:p>
@@ -7272,7 +7292,7 @@
             <a:fld id="{B61BEF0D-F0BB-DE4B-95CE-6DB70DBA9567}" type="datetimeFigureOut">
               <a:rPr lang="en-US" dirty="0"/>
               <a:pPr/>
-              <a:t>4/20/2017</a:t>
+              <a:t>4/23/2017</a:t>
             </a:fld>
             <a:endParaRPr lang="en-US" dirty="0"/>
           </a:p>
@@ -9386,7 +9406,7 @@
             <a:fld id="{B61BEF0D-F0BB-DE4B-95CE-6DB70DBA9567}" type="datetimeFigureOut">
               <a:rPr lang="en-US" dirty="0"/>
               <a:pPr/>
-              <a:t>4/20/2017</a:t>
+              <a:t>4/23/2017</a:t>
             </a:fld>
             <a:endParaRPr lang="en-US" dirty="0"/>
           </a:p>
@@ -9943,7 +9963,9 @@
           </a:xfrm>
         </p:spPr>
         <p:txBody>
-          <a:bodyPr/>
+          <a:bodyPr>
+            <a:normAutofit/>
+          </a:bodyPr>
           <a:lstStyle/>
           <a:p>
             <a:pPr marL="285750" indent="-285750">
@@ -9951,8 +9973,12 @@
               <a:buChar char="-"/>
             </a:pPr>
             <a:r>
-              <a:rPr lang="en-US" dirty="0" smtClean="0"/>
-              <a:t>Amish Shah</a:t>
+              <a:rPr lang="en-US" sz="2400" dirty="0" err="1"/>
+              <a:t>Akshay</a:t>
+            </a:r>
+            <a:r>
+              <a:rPr lang="en-US" sz="2400" dirty="0"/>
+              <a:t> Kamath</a:t>
             </a:r>
           </a:p>
           <a:p>
@@ -9960,7 +9986,17 @@
               <a:buFontTx/>
               <a:buChar char="-"/>
             </a:pPr>
-            <a:endParaRPr lang="en-US" dirty="0"/>
+            <a:r>
+              <a:rPr lang="en-US" sz="2400" dirty="0"/>
+              <a:t>Amish Shah</a:t>
+            </a:r>
+          </a:p>
+          <a:p>
+            <a:pPr marL="285750" indent="-285750">
+              <a:buFontTx/>
+              <a:buChar char="-"/>
+            </a:pPr>
+            <a:endParaRPr lang="en-US" sz="2400" dirty="0"/>
           </a:p>
         </p:txBody>
       </p:sp>
@@ -10667,14 +10703,14 @@
           <a:p>
             <a:r>
               <a:rPr lang="en-US" dirty="0"/>
-              <a:t>Method – Find Patterns</a:t>
-            </a:r>
-          </a:p>
-        </p:txBody>
-      </p:sp>
-      <p:sp>
-        <p:nvSpPr>
-          <p:cNvPr id="3" name="Content Placeholder 2"/>
+              <a:t>Method – Static Analysis: ASTs</a:t>
+            </a:r>
+          </a:p>
+        </p:txBody>
+      </p:sp>
+      <p:sp>
+        <p:nvSpPr>
+          <p:cNvPr id="4" name="Content Placeholder 3"/>
           <p:cNvSpPr>
             <a:spLocks noGrp="1"/>
           </p:cNvSpPr>
@@ -10682,25 +10718,138 @@
             <p:ph idx="1"/>
           </p:nvPr>
         </p:nvSpPr>
+        <p:spPr/>
+        <p:txBody>
+          <a:bodyPr/>
+          <a:lstStyle/>
+          <a:p>
+            <a:endParaRPr lang="en-US" dirty="0"/>
+          </a:p>
+        </p:txBody>
+      </p:sp>
+      <p:pic>
+        <p:nvPicPr>
+          <p:cNvPr id="9" name="Content Placeholder 5"/>
+          <p:cNvPicPr>
+            <a:picLocks noChangeAspect="1"/>
+          </p:cNvPicPr>
+          <p:nvPr/>
+        </p:nvPicPr>
+        <p:blipFill>
+          <a:blip r:embed="rId2"/>
+          <a:stretch>
+            <a:fillRect/>
+          </a:stretch>
+        </p:blipFill>
         <p:spPr>
           <a:xfrm>
-            <a:off x="2138108" y="1780032"/>
-            <a:ext cx="8915400" cy="3777622"/>
-          </a:xfrm>
-        </p:spPr>
-        <p:txBody>
-          <a:bodyPr/>
+            <a:off x="1545176" y="1415415"/>
+            <a:ext cx="7415832" cy="5218771"/>
+          </a:xfrm>
+          <a:prstGeom prst="rect">
+            <a:avLst/>
+          </a:prstGeom>
+        </p:spPr>
+      </p:pic>
+      <p:sp>
+        <p:nvSpPr>
+          <p:cNvPr id="10" name="Rectangle 9"/>
+          <p:cNvSpPr/>
+          <p:nvPr/>
+        </p:nvSpPr>
+        <p:spPr>
+          <a:xfrm>
+            <a:off x="8146471" y="1939636"/>
+            <a:ext cx="2613891" cy="2586182"/>
+          </a:xfrm>
+          <a:prstGeom prst="rect">
+            <a:avLst/>
+          </a:prstGeom>
+          <a:solidFill>
+            <a:schemeClr val="bg1"/>
+          </a:solidFill>
+        </p:spPr>
+        <p:style>
+          <a:lnRef idx="2">
+            <a:schemeClr val="accent1">
+              <a:shade val="50000"/>
+            </a:schemeClr>
+          </a:lnRef>
+          <a:fillRef idx="1">
+            <a:schemeClr val="accent1"/>
+          </a:fillRef>
+          <a:effectRef idx="0">
+            <a:schemeClr val="accent1"/>
+          </a:effectRef>
+          <a:fontRef idx="minor">
+            <a:schemeClr val="lt1"/>
+          </a:fontRef>
+        </p:style>
+        <p:txBody>
+          <a:bodyPr rtlCol="0" anchor="ctr"/>
           <a:lstStyle/>
           <a:p>
+            <a:pPr algn="ctr"/>
+            <a:endParaRPr lang="en-US" dirty="0">
+              <a:solidFill>
+                <a:schemeClr val="tx1"/>
+              </a:solidFill>
+            </a:endParaRPr>
+          </a:p>
+        </p:txBody>
+      </p:sp>
+      <p:sp>
+        <p:nvSpPr>
+          <p:cNvPr id="11" name="TextBox 10"/>
+          <p:cNvSpPr txBox="1"/>
+          <p:nvPr/>
+        </p:nvSpPr>
+        <p:spPr>
+          <a:xfrm>
+            <a:off x="8562107" y="1939636"/>
+            <a:ext cx="2032000" cy="1754326"/>
+          </a:xfrm>
+          <a:prstGeom prst="rect">
+            <a:avLst/>
+          </a:prstGeom>
+          <a:noFill/>
+        </p:spPr>
+        <p:txBody>
+          <a:bodyPr wrap="square" rtlCol="0">
+            <a:spAutoFit/>
+          </a:bodyPr>
+          <a:lstStyle/>
+          <a:p>
             <a:r>
               <a:rPr lang="en-US" dirty="0"/>
-              <a:t>Most common pattern (Screenshot of a code snippet explaining pattern)</a:t>
+              <a:t>while(b ≠ 0){</a:t>
             </a:r>
           </a:p>
           <a:p>
             <a:r>
               <a:rPr lang="en-US" dirty="0"/>
-              <a:t>Prefetched variables are being used in other activities </a:t>
+              <a:t>	if (..)</a:t>
+            </a:r>
+          </a:p>
+          <a:p>
+            <a:r>
+              <a:rPr lang="en-US" dirty="0"/>
+              <a:t>	..</a:t>
+            </a:r>
+          </a:p>
+          <a:p>
+            <a:r>
+              <a:rPr lang="en-US" dirty="0"/>
+              <a:t>}</a:t>
+            </a:r>
+          </a:p>
+          <a:p>
+            <a:endParaRPr lang="en-US" dirty="0"/>
+          </a:p>
+          <a:p>
+            <a:r>
+              <a:rPr lang="en-US" dirty="0"/>
+              <a:t>return a;</a:t>
             </a:r>
           </a:p>
         </p:txBody>
@@ -10708,7 +10857,7 @@
     </p:spTree>
     <p:extLst>
       <p:ext uri="{BB962C8B-B14F-4D97-AF65-F5344CB8AC3E}">
-        <p14:creationId xmlns:p14="http://schemas.microsoft.com/office/powerpoint/2010/main" val="3244046949"/>
+        <p14:creationId xmlns:p14="http://schemas.microsoft.com/office/powerpoint/2010/main" val="3207131005"/>
       </p:ext>
     </p:extLst>
   </p:cSld>
@@ -10737,86 +10886,6 @@
       </p:grpSpPr>
       <p:sp>
         <p:nvSpPr>
-          <p:cNvPr id="2" name="Title 1"/>
-          <p:cNvSpPr>
-            <a:spLocks noGrp="1"/>
-          </p:cNvSpPr>
-          <p:nvPr>
-            <p:ph type="title"/>
-          </p:nvPr>
-        </p:nvSpPr>
-        <p:spPr>
-          <a:xfrm>
-            <a:off x="2592925" y="624110"/>
-            <a:ext cx="8911687" cy="661997"/>
-          </a:xfrm>
-        </p:spPr>
-        <p:txBody>
-          <a:bodyPr/>
-          <a:lstStyle/>
-          <a:p>
-            <a:r>
-              <a:rPr lang="en-US" dirty="0"/>
-              <a:t>Method – Static Analysis: ASTs</a:t>
-            </a:r>
-          </a:p>
-        </p:txBody>
-      </p:sp>
-      <p:pic>
-        <p:nvPicPr>
-          <p:cNvPr id="6" name="Content Placeholder 5"/>
-          <p:cNvPicPr>
-            <a:picLocks noGrp="1" noChangeAspect="1"/>
-          </p:cNvPicPr>
-          <p:nvPr>
-            <p:ph idx="1"/>
-          </p:nvPr>
-        </p:nvPicPr>
-        <p:blipFill>
-          <a:blip r:embed="rId2"/>
-          <a:stretch>
-            <a:fillRect/>
-          </a:stretch>
-        </p:blipFill>
-        <p:spPr>
-          <a:xfrm>
-            <a:off x="3189249" y="1286106"/>
-            <a:ext cx="7415832" cy="5218771"/>
-          </a:xfrm>
-        </p:spPr>
-      </p:pic>
-    </p:spTree>
-    <p:extLst>
-      <p:ext uri="{BB962C8B-B14F-4D97-AF65-F5344CB8AC3E}">
-        <p14:creationId xmlns:p14="http://schemas.microsoft.com/office/powerpoint/2010/main" val="3207131005"/>
-      </p:ext>
-    </p:extLst>
-  </p:cSld>
-  <p:clrMapOvr>
-    <a:masterClrMapping/>
-  </p:clrMapOvr>
-</p:sld>
-</file>
-
-<file path=ppt/slides/slide13.xml><?xml version="1.0" encoding="utf-8"?>
-<p:sld xmlns:a="http://schemas.openxmlformats.org/drawingml/2006/main" xmlns:r="http://schemas.openxmlformats.org/officeDocument/2006/relationships" xmlns:p="http://schemas.openxmlformats.org/presentationml/2006/main">
-  <p:cSld>
-    <p:spTree>
-      <p:nvGrpSpPr>
-        <p:cNvPr id="1" name=""/>
-        <p:cNvGrpSpPr/>
-        <p:nvPr/>
-      </p:nvGrpSpPr>
-      <p:grpSpPr>
-        <a:xfrm>
-          <a:off x="0" y="0"/>
-          <a:ext cx="0" cy="0"/>
-          <a:chOff x="0" y="0"/>
-          <a:chExt cx="0" cy="0"/>
-        </a:xfrm>
-      </p:grpSpPr>
-      <p:sp>
-        <p:nvSpPr>
           <p:cNvPr id="3" name="Content Placeholder 2"/>
           <p:cNvSpPr>
             <a:spLocks noGrp="1"/>
@@ -10827,7 +10896,7 @@
         </p:nvSpPr>
         <p:spPr>
           <a:xfrm>
-            <a:off x="2559476" y="1152296"/>
+            <a:off x="2559476" y="2417681"/>
             <a:ext cx="8915400" cy="5605343"/>
           </a:xfrm>
         </p:spPr>
@@ -10859,34 +10928,6 @@
           </a:p>
           <a:p>
             <a:endParaRPr lang="en-US" dirty="0"/>
-          </a:p>
-          <a:p>
-            <a:r>
-              <a:rPr lang="en-US" dirty="0"/>
-              <a:t>Created a new </a:t>
-            </a:r>
-            <a:r>
-              <a:rPr lang="en-US" dirty="0" err="1"/>
-              <a:t>AsyncTask</a:t>
-            </a:r>
-            <a:r>
-              <a:rPr lang="en-US" dirty="0"/>
-              <a:t> with the respective URL that will executed procrastinated calls</a:t>
-            </a:r>
-          </a:p>
-          <a:p>
-            <a:r>
-              <a:rPr lang="en-US" dirty="0"/>
-              <a:t>This </a:t>
-            </a:r>
-            <a:r>
-              <a:rPr lang="en-US" dirty="0" err="1"/>
-              <a:t>AsyncTask</a:t>
-            </a:r>
-            <a:r>
-              <a:rPr lang="en-US" dirty="0"/>
-              <a:t> object will be called and executed when the new activity using the prefetch variable is executed</a:t>
-            </a:r>
           </a:p>
         </p:txBody>
       </p:sp>
@@ -11001,7 +11042,7 @@
         </p:nvSpPr>
         <p:spPr>
           <a:xfrm>
-            <a:off x="3010829" y="1152295"/>
+            <a:off x="3010829" y="2417680"/>
             <a:ext cx="1718485" cy="1063083"/>
           </a:xfrm>
           <a:prstGeom prst="rect">
@@ -11051,7 +11092,7 @@
         </p:nvSpPr>
         <p:spPr>
           <a:xfrm>
-            <a:off x="3010829" y="2505955"/>
+            <a:off x="3010829" y="3771340"/>
             <a:ext cx="1718485" cy="1531219"/>
           </a:xfrm>
           <a:prstGeom prst="rect">
@@ -11101,7 +11142,7 @@
         </p:nvSpPr>
         <p:spPr>
           <a:xfrm>
-            <a:off x="5298691" y="2505955"/>
+            <a:off x="5298691" y="3771340"/>
             <a:ext cx="1718485" cy="1531219"/>
           </a:xfrm>
           <a:prstGeom prst="rect">
@@ -11151,7 +11192,7 @@
         </p:nvSpPr>
         <p:spPr>
           <a:xfrm>
-            <a:off x="8067910" y="2505954"/>
+            <a:off x="8067910" y="3771339"/>
             <a:ext cx="1878978" cy="1531219"/>
           </a:xfrm>
           <a:prstGeom prst="rect">
@@ -11188,7 +11229,7 @@
                   <a:schemeClr val="tx1"/>
                 </a:solidFill>
               </a:rPr>
-              <a:t>Instrument the network call with procrastination condition</a:t>
+              <a:t>Execute network call for prefetch variable when intent invoked</a:t>
             </a:r>
           </a:p>
         </p:txBody>
@@ -11204,7 +11245,7 @@
         </p:nvCxnSpPr>
         <p:spPr>
           <a:xfrm>
-            <a:off x="3870072" y="2215378"/>
+            <a:off x="3870072" y="3480763"/>
             <a:ext cx="0" cy="290577"/>
           </a:xfrm>
           <a:prstGeom prst="straightConnector1">
@@ -11240,7 +11281,7 @@
         </p:nvCxnSpPr>
         <p:spPr>
           <a:xfrm flipV="1">
-            <a:off x="4729314" y="3271563"/>
+            <a:off x="4729314" y="4536948"/>
             <a:ext cx="569377" cy="2"/>
           </a:xfrm>
           <a:prstGeom prst="straightConnector1">
@@ -11276,7 +11317,7 @@
         </p:nvCxnSpPr>
         <p:spPr>
           <a:xfrm flipV="1">
-            <a:off x="7017176" y="3271564"/>
+            <a:off x="7017176" y="4536949"/>
             <a:ext cx="1050734" cy="1"/>
           </a:xfrm>
           <a:prstGeom prst="straightConnector1">
@@ -11309,7 +11350,7 @@
         </p:nvCxnSpPr>
         <p:spPr>
           <a:xfrm flipV="1">
-            <a:off x="6713035" y="1806497"/>
+            <a:off x="6713035" y="3071882"/>
             <a:ext cx="0" cy="692019"/>
           </a:xfrm>
           <a:prstGeom prst="line">
@@ -11339,7 +11380,7 @@
         </p:nvCxnSpPr>
         <p:spPr>
           <a:xfrm flipH="1">
-            <a:off x="5820937" y="1821365"/>
+            <a:off x="5820937" y="3086750"/>
             <a:ext cx="899532" cy="0"/>
           </a:xfrm>
           <a:prstGeom prst="line">
@@ -11369,7 +11410,7 @@
         </p:nvCxnSpPr>
         <p:spPr>
           <a:xfrm>
-            <a:off x="5828371" y="1813935"/>
+            <a:off x="5828371" y="3079320"/>
             <a:ext cx="0" cy="692019"/>
           </a:xfrm>
           <a:prstGeom prst="straightConnector1">
@@ -11402,7 +11443,7 @@
         </p:nvSpPr>
         <p:spPr>
           <a:xfrm>
-            <a:off x="7396976" y="2891886"/>
+            <a:off x="7396976" y="4157271"/>
             <a:ext cx="561372" cy="369332"/>
           </a:xfrm>
           <a:prstGeom prst="rect">
@@ -11431,7 +11472,7 @@
         </p:nvSpPr>
         <p:spPr>
           <a:xfrm>
-            <a:off x="5993841" y="2030712"/>
+            <a:off x="5993841" y="3296097"/>
             <a:ext cx="506870" cy="369332"/>
           </a:xfrm>
           <a:prstGeom prst="rect">
@@ -11465,7 +11506,7 @@
 </p:sld>
 </file>
 
-<file path=ppt/slides/slide14.xml><?xml version="1.0" encoding="utf-8"?>
+<file path=ppt/slides/slide13.xml><?xml version="1.0" encoding="utf-8"?>
 <p:sld xmlns:a="http://schemas.openxmlformats.org/drawingml/2006/main" xmlns:r="http://schemas.openxmlformats.org/officeDocument/2006/relationships" xmlns:p="http://schemas.openxmlformats.org/presentationml/2006/main">
   <p:cSld>
     <p:spTree>
@@ -11523,7 +11564,7 @@
           <a:blip r:embed="rId2">
             <a:extLst>
               <a:ext uri="{96DAC541-7B7A-43D3-8B79-37D633B846F1}">
-                <asvg:svgBlip xmlns:asvg="http://schemas.microsoft.com/office/drawing/2016/SVG/main" xmlns="" r:embed="rId3"/>
+                <asvg:svgBlip xmlns:asvg="http://schemas.microsoft.com/office/drawing/2016/SVG/main" r:embed="rId3"/>
               </a:ext>
             </a:extLst>
           </a:blip>
@@ -12159,6 +12200,150 @@
 </p:sld>
 </file>
 
+<file path=ppt/slides/slide14.xml><?xml version="1.0" encoding="utf-8"?>
+<p:sld xmlns:a="http://schemas.openxmlformats.org/drawingml/2006/main" xmlns:r="http://schemas.openxmlformats.org/officeDocument/2006/relationships" xmlns:p="http://schemas.openxmlformats.org/presentationml/2006/main">
+  <p:cSld>
+    <p:spTree>
+      <p:nvGrpSpPr>
+        <p:cNvPr id="1" name=""/>
+        <p:cNvGrpSpPr/>
+        <p:nvPr/>
+      </p:nvGrpSpPr>
+      <p:grpSpPr>
+        <a:xfrm>
+          <a:off x="0" y="0"/>
+          <a:ext cx="0" cy="0"/>
+          <a:chOff x="0" y="0"/>
+          <a:chExt cx="0" cy="0"/>
+        </a:xfrm>
+      </p:grpSpPr>
+      <p:sp>
+        <p:nvSpPr>
+          <p:cNvPr id="2" name="Title 1"/>
+          <p:cNvSpPr>
+            <a:spLocks noGrp="1"/>
+          </p:cNvSpPr>
+          <p:nvPr>
+            <p:ph type="title"/>
+          </p:nvPr>
+        </p:nvSpPr>
+        <p:spPr/>
+        <p:txBody>
+          <a:bodyPr/>
+          <a:lstStyle/>
+          <a:p>
+            <a:r>
+              <a:rPr lang="en-US" dirty="0"/>
+              <a:t>View </a:t>
+            </a:r>
+            <a:r>
+              <a:rPr lang="en-US" dirty="0" err="1"/>
+              <a:t>Prefetch</a:t>
+            </a:r>
+            <a:r>
+              <a:rPr lang="en-US" dirty="0"/>
+              <a:t> Correlation</a:t>
+            </a:r>
+          </a:p>
+        </p:txBody>
+      </p:sp>
+      <p:sp>
+        <p:nvSpPr>
+          <p:cNvPr id="3" name="Content Placeholder 2"/>
+          <p:cNvSpPr>
+            <a:spLocks noGrp="1"/>
+          </p:cNvSpPr>
+          <p:nvPr>
+            <p:ph idx="1"/>
+          </p:nvPr>
+        </p:nvSpPr>
+        <p:spPr>
+          <a:xfrm>
+            <a:off x="2589212" y="1429789"/>
+            <a:ext cx="8915400" cy="4481433"/>
+          </a:xfrm>
+        </p:spPr>
+        <p:txBody>
+          <a:bodyPr/>
+          <a:lstStyle/>
+          <a:p>
+            <a:endParaRPr lang="en-US" dirty="0"/>
+          </a:p>
+          <a:p>
+            <a:r>
+              <a:rPr lang="en-US" dirty="0"/>
+              <a:t>Key Limitation: General User Adaptability</a:t>
+            </a:r>
+          </a:p>
+          <a:p>
+            <a:r>
+              <a:rPr lang="en-US" dirty="0"/>
+              <a:t>Proposed Solution: Perform Study of </a:t>
+            </a:r>
+            <a:r>
+              <a:rPr lang="en-US" dirty="0" err="1"/>
+              <a:t>Prefetch</a:t>
+            </a:r>
+            <a:r>
+              <a:rPr lang="en-US" dirty="0"/>
+              <a:t> Necessity using VPC.</a:t>
+            </a:r>
+          </a:p>
+          <a:p>
+            <a:r>
+              <a:rPr lang="en-US" dirty="0"/>
+              <a:t>Inspired from Background Foreground Correlation</a:t>
+            </a:r>
+          </a:p>
+          <a:p>
+            <a:r>
+              <a:rPr lang="en-US" dirty="0"/>
+              <a:t>For each time a </a:t>
+            </a:r>
+            <a:r>
+              <a:rPr lang="en-US" dirty="0" err="1"/>
+              <a:t>prefetch</a:t>
+            </a:r>
+            <a:r>
+              <a:rPr lang="en-US" dirty="0"/>
+              <a:t> is performed, evaluate how many times a view is invoked. </a:t>
+            </a:r>
+          </a:p>
+          <a:p>
+            <a:r>
+              <a:rPr lang="en-US" dirty="0"/>
+              <a:t>Provides developer with whether </a:t>
+            </a:r>
+            <a:r>
+              <a:rPr lang="en-US" dirty="0" err="1"/>
+              <a:t>prefetch</a:t>
+            </a:r>
+            <a:r>
+              <a:rPr lang="en-US" dirty="0"/>
+              <a:t> is really required for a given view.</a:t>
+            </a:r>
+          </a:p>
+          <a:p>
+            <a:r>
+              <a:rPr lang="en-US" dirty="0"/>
+              <a:t>Implemented as a part of the package.</a:t>
+            </a:r>
+          </a:p>
+        </p:txBody>
+      </p:sp>
+    </p:spTree>
+    <p:extLst>
+      <p:ext uri="{BB962C8B-B14F-4D97-AF65-F5344CB8AC3E}">
+        <p14:creationId xmlns:p14="http://schemas.microsoft.com/office/powerpoint/2010/main" val="3008796874"/>
+      </p:ext>
+    </p:extLst>
+  </p:cSld>
+  <p:clrMapOvr>
+    <a:masterClrMapping/>
+  </p:clrMapOvr>
+</p:sld>
+</file>
+
 <file path=ppt/slides/slide15.xml><?xml version="1.0" encoding="utf-8"?>
 <p:sld xmlns:a="http://schemas.openxmlformats.org/drawingml/2006/main" xmlns:r="http://schemas.openxmlformats.org/officeDocument/2006/relationships" xmlns:p="http://schemas.openxmlformats.org/presentationml/2006/main">
   <p:cSld>
@@ -12192,18 +12377,9 @@
           <a:lstStyle/>
           <a:p>
             <a:r>
-              <a:rPr lang="en-US" dirty="0" smtClean="0"/>
-              <a:t>View </a:t>
-            </a:r>
-            <a:r>
-              <a:rPr lang="en-US" dirty="0" err="1" smtClean="0"/>
-              <a:t>Prefetch</a:t>
-            </a:r>
-            <a:r>
-              <a:rPr lang="en-US" dirty="0" smtClean="0"/>
-              <a:t> Correlation</a:t>
-            </a:r>
-            <a:endParaRPr lang="en-US" dirty="0"/>
+              <a:rPr lang="en-US" dirty="0"/>
+              <a:t>Approach &amp; Implementation</a:t>
+            </a:r>
           </a:p>
         </p:txBody>
       </p:sp>
@@ -12217,81 +12393,116 @@
             <p:ph idx="1"/>
           </p:nvPr>
         </p:nvSpPr>
-        <p:spPr>
-          <a:xfrm>
-            <a:off x="2589212" y="1429789"/>
-            <a:ext cx="8915400" cy="4481433"/>
-          </a:xfrm>
-        </p:spPr>
+        <p:spPr/>
         <p:txBody>
           <a:bodyPr/>
           <a:lstStyle/>
           <a:p>
-            <a:endParaRPr lang="en-US" dirty="0" smtClean="0"/>
-          </a:p>
-          <a:p>
-            <a:r>
-              <a:rPr lang="en-US" dirty="0" smtClean="0"/>
-              <a:t>Key Limitation: General User Adaptability</a:t>
-            </a:r>
-          </a:p>
-          <a:p>
-            <a:r>
-              <a:rPr lang="en-US" dirty="0" smtClean="0"/>
-              <a:t>Proposed Solution: Perform Study of </a:t>
-            </a:r>
-            <a:r>
-              <a:rPr lang="en-US" dirty="0" err="1" smtClean="0"/>
+            <a:r>
+              <a:rPr lang="en-US" dirty="0"/>
+              <a:t>Implement a </a:t>
+            </a:r>
+            <a:r>
+              <a:rPr lang="en-US" b="1" i="1" dirty="0"/>
+              <a:t>Simple POC Weather App, </a:t>
+            </a:r>
+            <a:r>
+              <a:rPr lang="en-US" dirty="0"/>
+              <a:t>with the </a:t>
+            </a:r>
+            <a:r>
+              <a:rPr lang="en-US" dirty="0" err="1"/>
+              <a:t>prefetch</a:t>
+            </a:r>
+            <a:r>
+              <a:rPr lang="en-US" dirty="0"/>
+              <a:t> pattern and 2 screens.</a:t>
+            </a:r>
+          </a:p>
+          <a:p>
+            <a:pPr lvl="1"/>
+            <a:r>
+              <a:rPr lang="en-US" dirty="0"/>
+              <a:t>First Screen – </a:t>
+            </a:r>
+            <a:r>
+              <a:rPr lang="en-US" dirty="0" err="1"/>
               <a:t>Prefetch</a:t>
             </a:r>
             <a:r>
-              <a:rPr lang="en-US" dirty="0" smtClean="0"/>
-              <a:t> Necessity using VPC</a:t>
-            </a:r>
-            <a:r>
-              <a:rPr lang="en-US" dirty="0" smtClean="0"/>
+              <a:rPr lang="en-US" dirty="0"/>
+              <a:t>, </a:t>
+            </a:r>
+          </a:p>
+          <a:p>
+            <a:pPr lvl="1"/>
+            <a:r>
+              <a:rPr lang="en-US" dirty="0"/>
+              <a:t>Second Screen – Use the </a:t>
+            </a:r>
+            <a:r>
+              <a:rPr lang="en-US" dirty="0" err="1"/>
+              <a:t>prefetch</a:t>
+            </a:r>
+            <a:r>
+              <a:rPr lang="en-US" dirty="0"/>
+              <a:t> data.</a:t>
+            </a:r>
+          </a:p>
+          <a:p>
+            <a:pPr marL="457200" lvl="1" indent="0">
+              <a:buNone/>
+            </a:pPr>
+            <a:endParaRPr lang="en-US" dirty="0"/>
+          </a:p>
+          <a:p>
+            <a:r>
+              <a:rPr lang="en-US" dirty="0"/>
+              <a:t>Implement </a:t>
+            </a:r>
+            <a:r>
+              <a:rPr lang="en-US" b="1" i="1" dirty="0"/>
+              <a:t>Instrumentation</a:t>
+            </a:r>
+            <a:r>
+              <a:rPr lang="en-US" dirty="0"/>
+              <a:t> and </a:t>
+            </a:r>
+            <a:r>
+              <a:rPr lang="en-US" b="1" i="1" dirty="0"/>
+              <a:t>Procrastination tool</a:t>
+            </a:r>
+            <a:r>
+              <a:rPr lang="en-US" dirty="0"/>
+              <a:t> for desktop.</a:t>
+            </a:r>
+          </a:p>
+          <a:p>
+            <a:r>
+              <a:rPr lang="en-US" dirty="0"/>
+              <a:t>Implement </a:t>
+            </a:r>
+            <a:r>
+              <a:rPr lang="en-US" b="1" i="1" dirty="0"/>
+              <a:t>Measurements Library</a:t>
+            </a:r>
+            <a:r>
+              <a:rPr lang="en-US" dirty="0"/>
+              <a:t> for data usage and VPC measurement.</a:t>
+            </a:r>
+          </a:p>
+          <a:p>
+            <a:r>
+              <a:rPr lang="en-US" dirty="0"/>
+              <a:t>Implement </a:t>
+            </a:r>
+            <a:r>
+              <a:rPr lang="en-US" b="1" i="1" dirty="0"/>
+              <a:t>Android Procrastination Library</a:t>
+            </a:r>
+            <a:r>
+              <a:rPr lang="en-US" dirty="0"/>
               <a:t>.</a:t>
-            </a:r>
-            <a:endParaRPr lang="en-US" dirty="0" smtClean="0"/>
-          </a:p>
-          <a:p>
-            <a:r>
-              <a:rPr lang="en-US" dirty="0" smtClean="0"/>
-              <a:t>Inspired from Background Foreground Correlation</a:t>
-            </a:r>
-          </a:p>
-          <a:p>
-            <a:r>
-              <a:rPr lang="en-US" dirty="0" smtClean="0"/>
-              <a:t>For each time a </a:t>
-            </a:r>
-            <a:r>
-              <a:rPr lang="en-US" dirty="0" err="1" smtClean="0"/>
-              <a:t>prefetch</a:t>
-            </a:r>
-            <a:r>
-              <a:rPr lang="en-US" dirty="0" smtClean="0"/>
-              <a:t> is performed, evaluate how many times a view is invoked. </a:t>
-            </a:r>
-          </a:p>
-          <a:p>
-            <a:r>
-              <a:rPr lang="en-US" dirty="0" smtClean="0"/>
-              <a:t>Provides developer with whether </a:t>
-            </a:r>
-            <a:r>
-              <a:rPr lang="en-US" dirty="0" err="1" smtClean="0"/>
-              <a:t>prefetch</a:t>
-            </a:r>
-            <a:r>
-              <a:rPr lang="en-US" dirty="0" smtClean="0"/>
-              <a:t> is really required for a given view.</a:t>
-            </a:r>
-          </a:p>
-          <a:p>
-            <a:r>
-              <a:rPr lang="en-US" dirty="0" smtClean="0"/>
-              <a:t>Implemented as a part of the package.</a:t>
             </a:r>
           </a:p>
         </p:txBody>
@@ -12299,7 +12510,7 @@
     </p:spTree>
     <p:extLst>
       <p:ext uri="{BB962C8B-B14F-4D97-AF65-F5344CB8AC3E}">
-        <p14:creationId xmlns:p14="http://schemas.microsoft.com/office/powerpoint/2010/main" val="3008796874"/>
+        <p14:creationId xmlns:p14="http://schemas.microsoft.com/office/powerpoint/2010/main" val="3154856639"/>
       </p:ext>
     </p:extLst>
   </p:cSld>
@@ -12342,10 +12553,9 @@
           <a:lstStyle/>
           <a:p>
             <a:r>
-              <a:rPr lang="en-US" dirty="0" smtClean="0"/>
-              <a:t>Approach &amp; Implementation</a:t>
-            </a:r>
-            <a:endParaRPr lang="en-US" dirty="0"/>
+              <a:rPr lang="en-US" dirty="0"/>
+              <a:t>Evaluation Methodology</a:t>
+            </a:r>
           </a:p>
         </p:txBody>
       </p:sp>
@@ -12359,37 +12569,31 @@
             <p:ph idx="1"/>
           </p:nvPr>
         </p:nvSpPr>
-        <p:spPr/>
+        <p:spPr>
+          <a:xfrm>
+            <a:off x="2589212" y="1905000"/>
+            <a:ext cx="8915400" cy="4443760"/>
+          </a:xfrm>
+        </p:spPr>
         <p:txBody>
           <a:bodyPr/>
           <a:lstStyle/>
           <a:p>
             <a:r>
               <a:rPr lang="en-US" dirty="0"/>
-              <a:t>Implement a </a:t>
-            </a:r>
-            <a:r>
-              <a:rPr lang="en-US" b="1" i="1" dirty="0"/>
-              <a:t>Simple POC Weather App, </a:t>
-            </a:r>
+              <a:t>Provide it to 4 users </a:t>
+            </a:r>
+          </a:p>
+          <a:p>
             <a:r>
               <a:rPr lang="en-US" dirty="0"/>
-              <a:t>with the </a:t>
-            </a:r>
-            <a:r>
-              <a:rPr lang="en-US" dirty="0" err="1"/>
-              <a:t>prefetch</a:t>
-            </a:r>
+              <a:t>Collect data for 7 days</a:t>
+            </a:r>
+          </a:p>
+          <a:p>
             <a:r>
               <a:rPr lang="en-US" dirty="0"/>
-              <a:t> pattern and 2 screens.</a:t>
-            </a:r>
-          </a:p>
-          <a:p>
-            <a:pPr lvl="1"/>
-            <a:r>
-              <a:rPr lang="en-US" dirty="0"/>
-              <a:t>First Screen – </a:t>
+              <a:t>2 Users – </a:t>
             </a:r>
             <a:r>
               <a:rPr lang="en-US" dirty="0" err="1"/>
@@ -12397,88 +12601,30 @@
             </a:r>
             <a:r>
               <a:rPr lang="en-US" dirty="0"/>
-              <a:t>, </a:t>
-            </a:r>
-            <a:endParaRPr lang="en-US" dirty="0" smtClean="0"/>
-          </a:p>
-          <a:p>
-            <a:pPr lvl="1"/>
-            <a:r>
-              <a:rPr lang="en-US" dirty="0" smtClean="0"/>
-              <a:t>Second </a:t>
+              <a:t> App , 2 Users – </a:t>
+            </a:r>
+            <a:r>
+              <a:rPr lang="en-US" dirty="0" err="1"/>
+              <a:t>Prefetch</a:t>
             </a:r>
             <a:r>
               <a:rPr lang="en-US" dirty="0"/>
-              <a:t>Screen – Use the </a:t>
-            </a:r>
-            <a:r>
-              <a:rPr lang="en-US" dirty="0" err="1"/>
-              <a:t>prefetch</a:t>
-            </a:r>
+              <a:t> Procrastinated  App</a:t>
+            </a:r>
+          </a:p>
+          <a:p>
             <a:r>
               <a:rPr lang="en-US" dirty="0"/>
-              <a:t> data</a:t>
-            </a:r>
-            <a:r>
-              <a:rPr lang="en-US" dirty="0" smtClean="0"/>
-              <a:t>.</a:t>
-            </a:r>
-          </a:p>
-          <a:p>
-            <a:pPr marL="457200" lvl="1" indent="0">
-              <a:buNone/>
-            </a:pPr>
-            <a:endParaRPr lang="en-US" dirty="0"/>
-          </a:p>
-          <a:p>
-            <a:r>
-              <a:rPr lang="en-US" dirty="0" smtClean="0"/>
-              <a:t>Implement </a:t>
-            </a:r>
-            <a:r>
-              <a:rPr lang="en-US" b="1" i="1" dirty="0" smtClean="0"/>
-              <a:t>Instrumentation</a:t>
-            </a:r>
-            <a:r>
-              <a:rPr lang="en-US" dirty="0" smtClean="0"/>
-              <a:t> and </a:t>
-            </a:r>
-            <a:r>
-              <a:rPr lang="en-US" b="1" i="1" dirty="0" smtClean="0"/>
-              <a:t>Procrastination tool</a:t>
-            </a:r>
-            <a:r>
-              <a:rPr lang="en-US" dirty="0" smtClean="0"/>
-              <a:t> for desktop.</a:t>
-            </a:r>
-          </a:p>
-          <a:p>
-            <a:r>
-              <a:rPr lang="en-US" dirty="0" smtClean="0"/>
-              <a:t>Implement </a:t>
-            </a:r>
-            <a:r>
-              <a:rPr lang="en-US" b="1" i="1" dirty="0" smtClean="0"/>
-              <a:t>Measurements Library</a:t>
-            </a:r>
-            <a:r>
-              <a:rPr lang="en-US" dirty="0" smtClean="0"/>
-              <a:t> for data usage and VPC measurement.</a:t>
-            </a:r>
-          </a:p>
-          <a:p>
-            <a:r>
-              <a:rPr lang="en-US" dirty="0" smtClean="0"/>
-              <a:t>Implement </a:t>
-            </a:r>
-            <a:r>
-              <a:rPr lang="en-US" b="1" i="1" dirty="0" smtClean="0"/>
-              <a:t>Android Procrastination Library</a:t>
-            </a:r>
-            <a:r>
-              <a:rPr lang="en-US" dirty="0" smtClean="0"/>
-              <a:t>.</a:t>
-            </a:r>
+              <a:t>Track view pre-fetch correlation.</a:t>
+            </a:r>
+          </a:p>
+          <a:p>
+            <a:r>
+              <a:rPr lang="en-US" dirty="0"/>
+              <a:t>Track network data usage of app for each day per user.</a:t>
+            </a:r>
+          </a:p>
+          <a:p>
             <a:endParaRPr lang="en-US" dirty="0"/>
           </a:p>
         </p:txBody>
@@ -12486,7 +12632,7 @@
     </p:spTree>
     <p:extLst>
       <p:ext uri="{BB962C8B-B14F-4D97-AF65-F5344CB8AC3E}">
-        <p14:creationId xmlns:p14="http://schemas.microsoft.com/office/powerpoint/2010/main" val="3154856639"/>
+        <p14:creationId xmlns:p14="http://schemas.microsoft.com/office/powerpoint/2010/main" val="437405614"/>
       </p:ext>
     </p:extLst>
   </p:cSld>
@@ -12523,132 +12669,6 @@
             <p:ph type="title"/>
           </p:nvPr>
         </p:nvSpPr>
-        <p:spPr/>
-        <p:txBody>
-          <a:bodyPr/>
-          <a:lstStyle/>
-          <a:p>
-            <a:r>
-              <a:rPr lang="en-US" dirty="0" smtClean="0"/>
-              <a:t>Evaluation Methodology</a:t>
-            </a:r>
-            <a:endParaRPr lang="en-US" dirty="0"/>
-          </a:p>
-        </p:txBody>
-      </p:sp>
-      <p:sp>
-        <p:nvSpPr>
-          <p:cNvPr id="3" name="Content Placeholder 2"/>
-          <p:cNvSpPr>
-            <a:spLocks noGrp="1"/>
-          </p:cNvSpPr>
-          <p:nvPr>
-            <p:ph idx="1"/>
-          </p:nvPr>
-        </p:nvSpPr>
-        <p:spPr>
-          <a:xfrm>
-            <a:off x="2589212" y="1905000"/>
-            <a:ext cx="8915400" cy="4443760"/>
-          </a:xfrm>
-        </p:spPr>
-        <p:txBody>
-          <a:bodyPr/>
-          <a:lstStyle/>
-          <a:p>
-            <a:r>
-              <a:rPr lang="en-US" dirty="0" smtClean="0"/>
-              <a:t>Provide it to 4 users </a:t>
-            </a:r>
-            <a:endParaRPr lang="en-US" dirty="0"/>
-          </a:p>
-          <a:p>
-            <a:r>
-              <a:rPr lang="en-US" dirty="0" smtClean="0"/>
-              <a:t>Collect data for 7 days</a:t>
-            </a:r>
-          </a:p>
-          <a:p>
-            <a:r>
-              <a:rPr lang="en-US" dirty="0" smtClean="0"/>
-              <a:t>2 Users – </a:t>
-            </a:r>
-            <a:r>
-              <a:rPr lang="en-US" dirty="0" err="1" smtClean="0"/>
-              <a:t>Prefetch</a:t>
-            </a:r>
-            <a:r>
-              <a:rPr lang="en-US" dirty="0" smtClean="0"/>
-              <a:t> App , 2 Users – </a:t>
-            </a:r>
-            <a:r>
-              <a:rPr lang="en-US" dirty="0" err="1" smtClean="0"/>
-              <a:t>Prefetch</a:t>
-            </a:r>
-            <a:r>
-              <a:rPr lang="en-US" dirty="0" smtClean="0"/>
-              <a:t> Procrastinated  App</a:t>
-            </a:r>
-            <a:endParaRPr lang="en-US" dirty="0"/>
-          </a:p>
-          <a:p>
-            <a:r>
-              <a:rPr lang="en-US" dirty="0" smtClean="0"/>
-              <a:t>Track view pre-fetch correlation.</a:t>
-            </a:r>
-          </a:p>
-          <a:p>
-            <a:r>
-              <a:rPr lang="en-US" dirty="0" smtClean="0"/>
-              <a:t>Track network data usage of app for each day per user.</a:t>
-            </a:r>
-            <a:endParaRPr lang="en-US" dirty="0"/>
-          </a:p>
-          <a:p>
-            <a:endParaRPr lang="en-US" dirty="0"/>
-          </a:p>
-        </p:txBody>
-      </p:sp>
-    </p:spTree>
-    <p:extLst>
-      <p:ext uri="{BB962C8B-B14F-4D97-AF65-F5344CB8AC3E}">
-        <p14:creationId xmlns:p14="http://schemas.microsoft.com/office/powerpoint/2010/main" val="437405614"/>
-      </p:ext>
-    </p:extLst>
-  </p:cSld>
-  <p:clrMapOvr>
-    <a:masterClrMapping/>
-  </p:clrMapOvr>
-</p:sld>
-</file>
-
-<file path=ppt/slides/slide18.xml><?xml version="1.0" encoding="utf-8"?>
-<p:sld xmlns:a="http://schemas.openxmlformats.org/drawingml/2006/main" xmlns:r="http://schemas.openxmlformats.org/officeDocument/2006/relationships" xmlns:p="http://schemas.openxmlformats.org/presentationml/2006/main">
-  <p:cSld>
-    <p:spTree>
-      <p:nvGrpSpPr>
-        <p:cNvPr id="1" name=""/>
-        <p:cNvGrpSpPr/>
-        <p:nvPr/>
-      </p:nvGrpSpPr>
-      <p:grpSpPr>
-        <a:xfrm>
-          <a:off x="0" y="0"/>
-          <a:ext cx="0" cy="0"/>
-          <a:chOff x="0" y="0"/>
-          <a:chExt cx="0" cy="0"/>
-        </a:xfrm>
-      </p:grpSpPr>
-      <p:sp>
-        <p:nvSpPr>
-          <p:cNvPr id="2" name="Title 1"/>
-          <p:cNvSpPr>
-            <a:spLocks noGrp="1"/>
-          </p:cNvSpPr>
-          <p:nvPr>
-            <p:ph type="title"/>
-          </p:nvPr>
-        </p:nvSpPr>
         <p:spPr>
           <a:xfrm>
             <a:off x="1953761" y="344710"/>
@@ -12661,10 +12681,9 @@
           <a:p>
             <a:pPr algn="ctr"/>
             <a:r>
-              <a:rPr lang="en-US" dirty="0" smtClean="0"/>
+              <a:rPr lang="en-US" dirty="0"/>
               <a:t>Results</a:t>
             </a:r>
-            <a:endParaRPr lang="en-US" dirty="0"/>
           </a:p>
         </p:txBody>
       </p:sp>
@@ -12705,6 +12724,95 @@
 </p:sld>
 </file>
 
+<file path=ppt/slides/slide18.xml><?xml version="1.0" encoding="utf-8"?>
+<p:sld xmlns:a="http://schemas.openxmlformats.org/drawingml/2006/main" xmlns:r="http://schemas.openxmlformats.org/officeDocument/2006/relationships" xmlns:p="http://schemas.openxmlformats.org/presentationml/2006/main">
+  <p:cSld>
+    <p:spTree>
+      <p:nvGrpSpPr>
+        <p:cNvPr id="1" name=""/>
+        <p:cNvGrpSpPr/>
+        <p:nvPr/>
+      </p:nvGrpSpPr>
+      <p:grpSpPr>
+        <a:xfrm>
+          <a:off x="0" y="0"/>
+          <a:ext cx="0" cy="0"/>
+          <a:chOff x="0" y="0"/>
+          <a:chExt cx="0" cy="0"/>
+        </a:xfrm>
+      </p:grpSpPr>
+      <p:sp>
+        <p:nvSpPr>
+          <p:cNvPr id="2" name="Title 1"/>
+          <p:cNvSpPr>
+            <a:spLocks noGrp="1"/>
+          </p:cNvSpPr>
+          <p:nvPr>
+            <p:ph type="title"/>
+          </p:nvPr>
+        </p:nvSpPr>
+        <p:spPr>
+          <a:xfrm>
+            <a:off x="1864792" y="522510"/>
+            <a:ext cx="8911687" cy="1280890"/>
+          </a:xfrm>
+        </p:spPr>
+        <p:txBody>
+          <a:bodyPr/>
+          <a:lstStyle/>
+          <a:p>
+            <a:pPr algn="ctr"/>
+            <a:r>
+              <a:rPr lang="en-US" dirty="0"/>
+              <a:t>Results – Procrastinated vs </a:t>
+            </a:r>
+            <a:br>
+              <a:rPr lang="en-US" dirty="0"/>
+            </a:br>
+            <a:r>
+              <a:rPr lang="en-US" dirty="0"/>
+              <a:t>Non Procrastinated</a:t>
+            </a:r>
+          </a:p>
+        </p:txBody>
+      </p:sp>
+      <p:graphicFrame>
+        <p:nvGraphicFramePr>
+          <p:cNvPr id="5" name="Chart 4"/>
+          <p:cNvGraphicFramePr>
+            <a:graphicFrameLocks/>
+          </p:cNvGraphicFramePr>
+          <p:nvPr>
+            <p:extLst>
+              <p:ext uri="{D42A27DB-BD31-4B8C-83A1-F6EECF244321}">
+                <p14:modId xmlns:p14="http://schemas.microsoft.com/office/powerpoint/2010/main" val="1472571515"/>
+              </p:ext>
+            </p:extLst>
+          </p:nvPr>
+        </p:nvGraphicFramePr>
+        <p:xfrm>
+          <a:off x="2269067" y="1803399"/>
+          <a:ext cx="8144935" cy="4715933"/>
+        </p:xfrm>
+        <a:graphic>
+          <a:graphicData uri="http://schemas.openxmlformats.org/drawingml/2006/chart">
+            <c:chart xmlns:c="http://schemas.openxmlformats.org/drawingml/2006/chart" xmlns:r="http://schemas.openxmlformats.org/officeDocument/2006/relationships" r:id="rId2"/>
+          </a:graphicData>
+        </a:graphic>
+      </p:graphicFrame>
+    </p:spTree>
+    <p:extLst>
+      <p:ext uri="{BB962C8B-B14F-4D97-AF65-F5344CB8AC3E}">
+        <p14:creationId xmlns:p14="http://schemas.microsoft.com/office/powerpoint/2010/main" val="1427784178"/>
+      </p:ext>
+    </p:extLst>
+  </p:cSld>
+  <p:clrMapOvr>
+    <a:masterClrMapping/>
+  </p:clrMapOvr>
+</p:sld>
+</file>
+
 <file path=ppt/slides/slide19.xml><?xml version="1.0" encoding="utf-8"?>
 <p:sld xmlns:a="http://schemas.openxmlformats.org/drawingml/2006/main" xmlns:r="http://schemas.openxmlformats.org/officeDocument/2006/relationships" xmlns:p="http://schemas.openxmlformats.org/presentationml/2006/main">
   <p:cSld>
@@ -12732,60 +12840,68 @@
             <p:ph type="title"/>
           </p:nvPr>
         </p:nvSpPr>
-        <p:spPr>
-          <a:xfrm>
-            <a:off x="1864792" y="522510"/>
-            <a:ext cx="8911687" cy="1280890"/>
-          </a:xfrm>
-        </p:spPr>
+        <p:spPr/>
         <p:txBody>
           <a:bodyPr/>
           <a:lstStyle/>
           <a:p>
             <a:pPr algn="ctr"/>
             <a:r>
-              <a:rPr lang="en-US" dirty="0" smtClean="0"/>
-              <a:t>Results – Procrastinated vs </a:t>
-            </a:r>
-            <a:br>
-              <a:rPr lang="en-US" dirty="0" smtClean="0"/>
-            </a:br>
-            <a:r>
-              <a:rPr lang="en-US" dirty="0" smtClean="0"/>
-              <a:t>Non Procrastinated</a:t>
-            </a:r>
-            <a:endParaRPr lang="en-US" dirty="0"/>
-          </a:p>
-        </p:txBody>
-      </p:sp>
-      <p:graphicFrame>
-        <p:nvGraphicFramePr>
-          <p:cNvPr id="5" name="Chart 4"/>
-          <p:cNvGraphicFramePr>
-            <a:graphicFrameLocks/>
-          </p:cNvGraphicFramePr>
+              <a:rPr lang="en-US" dirty="0"/>
+              <a:t>Results Summary</a:t>
+            </a:r>
+          </a:p>
+        </p:txBody>
+      </p:sp>
+      <p:sp>
+        <p:nvSpPr>
+          <p:cNvPr id="3" name="Content Placeholder 2"/>
+          <p:cNvSpPr>
+            <a:spLocks noGrp="1"/>
+          </p:cNvSpPr>
           <p:nvPr>
-            <p:extLst>
-              <p:ext uri="{D42A27DB-BD31-4B8C-83A1-F6EECF244321}">
-                <p14:modId xmlns:p14="http://schemas.microsoft.com/office/powerpoint/2010/main" val="1324968578"/>
-              </p:ext>
-            </p:extLst>
+            <p:ph idx="1"/>
           </p:nvPr>
-        </p:nvGraphicFramePr>
-        <p:xfrm>
-          <a:off x="2590802" y="1803400"/>
-          <a:ext cx="7823200" cy="4030134"/>
-        </p:xfrm>
-        <a:graphic>
-          <a:graphicData uri="http://schemas.openxmlformats.org/drawingml/2006/chart">
-            <c:chart xmlns:c="http://schemas.openxmlformats.org/drawingml/2006/chart" xmlns:r="http://schemas.openxmlformats.org/officeDocument/2006/relationships" r:id="rId2"/>
-          </a:graphicData>
-        </a:graphic>
-      </p:graphicFrame>
+        </p:nvSpPr>
+        <p:spPr/>
+        <p:txBody>
+          <a:bodyPr>
+            <a:normAutofit/>
+          </a:bodyPr>
+          <a:lstStyle/>
+          <a:p>
+            <a:r>
+              <a:rPr lang="en-US" sz="2400" dirty="0"/>
+              <a:t>Comparing User 4 to User 1 yields 27% savings in data</a:t>
+            </a:r>
+          </a:p>
+          <a:p>
+            <a:r>
+              <a:rPr lang="en-US" sz="2400" dirty="0"/>
+              <a:t>Comparing User 3 to User 1 yields 41% savings in data</a:t>
+            </a:r>
+          </a:p>
+          <a:p>
+            <a:r>
+              <a:rPr lang="en-US" sz="2400" dirty="0"/>
+              <a:t>User 4 VPC &gt; User 3 VPC. Hence User 4 consumes more data.</a:t>
+            </a:r>
+          </a:p>
+          <a:p>
+            <a:r>
+              <a:rPr lang="en-US" sz="2400" dirty="0"/>
+              <a:t>Mean Saving of 34%</a:t>
+            </a:r>
+          </a:p>
+          <a:p>
+            <a:endParaRPr lang="en-US" sz="2400" dirty="0"/>
+          </a:p>
+        </p:txBody>
+      </p:sp>
     </p:spTree>
     <p:extLst>
       <p:ext uri="{BB962C8B-B14F-4D97-AF65-F5344CB8AC3E}">
-        <p14:creationId xmlns:p14="http://schemas.microsoft.com/office/powerpoint/2010/main" val="1427784178"/>
+        <p14:creationId xmlns:p14="http://schemas.microsoft.com/office/powerpoint/2010/main" val="1286010416"/>
       </p:ext>
     </p:extLst>
   </p:cSld>
@@ -12852,12 +12968,12 @@
         </p:spPr>
         <p:txBody>
           <a:bodyPr>
-            <a:normAutofit lnSpcReduction="10000"/>
+            <a:normAutofit fontScale="92500" lnSpcReduction="10000"/>
           </a:bodyPr>
           <a:lstStyle/>
           <a:p>
             <a:r>
-              <a:rPr lang="en-US" spc="-1" dirty="0">
+              <a:rPr lang="en-US" sz="2000" spc="-1" dirty="0">
                 <a:uFill>
                   <a:solidFill>
                     <a:srgbClr val="FFFFFF"/>
@@ -12869,7 +12985,7 @@
             </a:r>
           </a:p>
           <a:p>
-            <a:endParaRPr lang="en-US" spc="-1" dirty="0">
+            <a:endParaRPr lang="en-US" sz="2000" spc="-1" dirty="0">
               <a:uFill>
                 <a:solidFill>
                   <a:srgbClr val="FFFFFF"/>
@@ -12879,7 +12995,7 @@
             </a:endParaRPr>
           </a:p>
           <a:p>
-            <a:endParaRPr lang="en-US" spc="-1" dirty="0">
+            <a:endParaRPr lang="en-US" sz="2000" spc="-1" dirty="0">
               <a:uFill>
                 <a:solidFill>
                   <a:srgbClr val="FFFFFF"/>
@@ -12889,7 +13005,7 @@
             </a:endParaRPr>
           </a:p>
           <a:p>
-            <a:endParaRPr lang="en-US" spc="-1" dirty="0">
+            <a:endParaRPr lang="en-US" sz="2000" spc="-1" dirty="0">
               <a:uFill>
                 <a:solidFill>
                   <a:srgbClr val="FFFFFF"/>
@@ -12899,7 +13015,7 @@
             </a:endParaRPr>
           </a:p>
           <a:p>
-            <a:endParaRPr lang="en-US" spc="-1" dirty="0">
+            <a:endParaRPr lang="en-US" sz="2000" spc="-1" dirty="0">
               <a:uFill>
                 <a:solidFill>
                   <a:srgbClr val="FFFFFF"/>
@@ -12909,7 +13025,7 @@
             </a:endParaRPr>
           </a:p>
           <a:p>
-            <a:endParaRPr lang="en-US" spc="-1" dirty="0">
+            <a:endParaRPr lang="en-US" sz="2000" spc="-1" dirty="0">
               <a:uFill>
                 <a:solidFill>
                   <a:srgbClr val="FFFFFF"/>
@@ -12919,7 +13035,7 @@
             </a:endParaRPr>
           </a:p>
           <a:p>
-            <a:endParaRPr lang="en-US" spc="-1" dirty="0">
+            <a:endParaRPr lang="en-US" sz="2000" spc="-1" dirty="0">
               <a:uFill>
                 <a:solidFill>
                   <a:srgbClr val="FFFFFF"/>
@@ -12929,7 +13045,7 @@
             </a:endParaRPr>
           </a:p>
           <a:p>
-            <a:endParaRPr lang="en-US" spc="-1" dirty="0">
+            <a:endParaRPr lang="en-US" sz="2000" spc="-1" dirty="0">
               <a:uFill>
                 <a:solidFill>
                   <a:srgbClr val="FFFFFF"/>
@@ -12939,7 +13055,7 @@
             </a:endParaRPr>
           </a:p>
           <a:p>
-            <a:endParaRPr lang="en-US" spc="-1" dirty="0">
+            <a:endParaRPr lang="en-US" sz="2000" spc="-1" dirty="0">
               <a:uFill>
                 <a:solidFill>
                   <a:srgbClr val="FFFFFF"/>
@@ -12949,7 +13065,7 @@
             </a:endParaRPr>
           </a:p>
           <a:p>
-            <a:endParaRPr lang="en-US" spc="-1" dirty="0">
+            <a:endParaRPr lang="en-US" sz="2000" spc="-1" dirty="0">
               <a:uFill>
                 <a:solidFill>
                   <a:srgbClr val="FFFFFF"/>
@@ -12959,7 +13075,7 @@
             </a:endParaRPr>
           </a:p>
           <a:p>
-            <a:endParaRPr lang="en-US" spc="-1" dirty="0">
+            <a:endParaRPr lang="en-US" sz="2000" spc="-1" dirty="0">
               <a:uFill>
                 <a:solidFill>
                   <a:srgbClr val="FFFFFF"/>
@@ -12970,7 +13086,7 @@
           </a:p>
           <a:p>
             <a:r>
-              <a:rPr lang="en-US" spc="-1" dirty="0">
+              <a:rPr lang="en-US" sz="2000" spc="-1" dirty="0">
                 <a:uFill>
                   <a:solidFill>
                     <a:srgbClr val="FFFFFF"/>
@@ -12982,7 +13098,7 @@
             </a:r>
           </a:p>
           <a:p>
-            <a:endParaRPr lang="en-US" spc="-1" dirty="0">
+            <a:endParaRPr lang="en-US" sz="2000" spc="-1" dirty="0">
               <a:uFill>
                 <a:solidFill>
                   <a:srgbClr val="FFFFFF"/>
@@ -12992,7 +13108,7 @@
             </a:endParaRPr>
           </a:p>
           <a:p>
-            <a:endParaRPr lang="en-US" dirty="0"/>
+            <a:endParaRPr lang="en-US" sz="2000" dirty="0"/>
           </a:p>
         </p:txBody>
       </p:sp>
@@ -13115,10 +13231,9 @@
           <a:p>
             <a:pPr algn="ctr"/>
             <a:r>
-              <a:rPr lang="en-US" dirty="0" smtClean="0"/>
-              <a:t>Results Summary</a:t>
-            </a:r>
-            <a:endParaRPr lang="en-US" dirty="0"/>
+              <a:rPr lang="en-US" dirty="0"/>
+              <a:t>Limitations</a:t>
+            </a:r>
           </a:p>
         </p:txBody>
       </p:sp>
@@ -13134,42 +13249,43 @@
         </p:nvSpPr>
         <p:spPr/>
         <p:txBody>
-          <a:bodyPr/>
+          <a:bodyPr>
+            <a:normAutofit/>
+          </a:bodyPr>
           <a:lstStyle/>
           <a:p>
             <a:r>
-              <a:rPr lang="en-US" dirty="0" smtClean="0"/>
-              <a:t>Comparing User 4 to User 1 yields 27% savings in data</a:t>
-            </a:r>
-          </a:p>
-          <a:p>
-            <a:r>
-              <a:rPr lang="en-US" dirty="0" smtClean="0"/>
-              <a:t>Comparing User 3 to User 1 yields 41% savings in data</a:t>
-            </a:r>
-          </a:p>
-          <a:p>
-            <a:r>
-              <a:rPr lang="en-US" dirty="0" smtClean="0"/>
-              <a:t>User 4 VPC &gt; User 3 VPC. Hence User 4 consumes more data.</a:t>
-            </a:r>
-            <a:endParaRPr lang="en-US" dirty="0"/>
-          </a:p>
-          <a:p>
-            <a:r>
-              <a:rPr lang="en-US" dirty="0" smtClean="0"/>
-              <a:t>Mean Saving of 34%</a:t>
-            </a:r>
-          </a:p>
-          <a:p>
-            <a:endParaRPr lang="en-US" dirty="0" smtClean="0"/>
+              <a:rPr lang="en-US" sz="2400" dirty="0"/>
+              <a:t>Limited to one pattern only. </a:t>
+            </a:r>
+          </a:p>
+          <a:p>
+            <a:r>
+              <a:rPr lang="en-US" sz="2400" dirty="0"/>
+              <a:t>Limited to Java source code analysis rather than bytecode</a:t>
+            </a:r>
+          </a:p>
+          <a:p>
+            <a:r>
+              <a:rPr lang="en-US" sz="2400" dirty="0"/>
+              <a:t>Not yet tested on Post data.</a:t>
+            </a:r>
+          </a:p>
+          <a:p>
+            <a:r>
+              <a:rPr lang="en-US" sz="2400" dirty="0"/>
+              <a:t>Instrumentation process requires some developer involvement.</a:t>
+            </a:r>
+          </a:p>
+          <a:p>
+            <a:endParaRPr lang="en-US" sz="2400" dirty="0"/>
           </a:p>
         </p:txBody>
       </p:sp>
     </p:spTree>
     <p:extLst>
       <p:ext uri="{BB962C8B-B14F-4D97-AF65-F5344CB8AC3E}">
-        <p14:creationId xmlns:p14="http://schemas.microsoft.com/office/powerpoint/2010/main" val="1286010416"/>
+        <p14:creationId xmlns:p14="http://schemas.microsoft.com/office/powerpoint/2010/main" val="1095983116"/>
       </p:ext>
     </p:extLst>
   </p:cSld>
@@ -13211,12 +13327,10 @@
           <a:bodyPr/>
           <a:lstStyle/>
           <a:p>
-            <a:pPr algn="ctr"/>
-            <a:r>
-              <a:rPr lang="en-US" dirty="0" smtClean="0"/>
-              <a:t>Limitations</a:t>
-            </a:r>
-            <a:endParaRPr lang="en-US" dirty="0"/>
+            <a:r>
+              <a:rPr lang="en-US" dirty="0"/>
+              <a:t>Potential Future Work</a:t>
+            </a:r>
           </a:p>
         </p:txBody>
       </p:sp>
@@ -13232,131 +13346,36 @@
         </p:nvSpPr>
         <p:spPr/>
         <p:txBody>
-          <a:bodyPr/>
+          <a:bodyPr>
+            <a:normAutofit/>
+          </a:bodyPr>
           <a:lstStyle/>
           <a:p>
             <a:r>
-              <a:rPr lang="en-US" dirty="0" smtClean="0"/>
-              <a:t>Limited to one pattern only. </a:t>
-            </a:r>
-            <a:endParaRPr lang="en-US" dirty="0"/>
-          </a:p>
-          <a:p>
-            <a:r>
-              <a:rPr lang="en-US" dirty="0" smtClean="0"/>
-              <a:t>Limited to Java source code analysis rather than bytecode</a:t>
-            </a:r>
-          </a:p>
-          <a:p>
-            <a:r>
-              <a:rPr lang="en-US" dirty="0" smtClean="0"/>
-              <a:t>Not yet tested on Post data.</a:t>
-            </a:r>
-          </a:p>
-          <a:p>
-            <a:r>
-              <a:rPr lang="en-US" dirty="0" smtClean="0"/>
-              <a:t>Instrumentation process requires some developer involvement.</a:t>
-            </a:r>
-          </a:p>
-          <a:p>
-            <a:endParaRPr lang="en-US" dirty="0"/>
-          </a:p>
-        </p:txBody>
-      </p:sp>
-    </p:spTree>
-    <p:extLst>
-      <p:ext uri="{BB962C8B-B14F-4D97-AF65-F5344CB8AC3E}">
-        <p14:creationId xmlns:p14="http://schemas.microsoft.com/office/powerpoint/2010/main" val="1095983116"/>
-      </p:ext>
-    </p:extLst>
-  </p:cSld>
-  <p:clrMapOvr>
-    <a:masterClrMapping/>
-  </p:clrMapOvr>
-</p:sld>
-</file>
-
-<file path=ppt/slides/slide22.xml><?xml version="1.0" encoding="utf-8"?>
-<p:sld xmlns:a="http://schemas.openxmlformats.org/drawingml/2006/main" xmlns:r="http://schemas.openxmlformats.org/officeDocument/2006/relationships" xmlns:p="http://schemas.openxmlformats.org/presentationml/2006/main">
-  <p:cSld>
-    <p:spTree>
-      <p:nvGrpSpPr>
-        <p:cNvPr id="1" name=""/>
-        <p:cNvGrpSpPr/>
-        <p:nvPr/>
-      </p:nvGrpSpPr>
-      <p:grpSpPr>
-        <a:xfrm>
-          <a:off x="0" y="0"/>
-          <a:ext cx="0" cy="0"/>
-          <a:chOff x="0" y="0"/>
-          <a:chExt cx="0" cy="0"/>
-        </a:xfrm>
-      </p:grpSpPr>
-      <p:sp>
-        <p:nvSpPr>
-          <p:cNvPr id="2" name="Title 1"/>
-          <p:cNvSpPr>
-            <a:spLocks noGrp="1"/>
-          </p:cNvSpPr>
-          <p:nvPr>
-            <p:ph type="title"/>
-          </p:nvPr>
-        </p:nvSpPr>
-        <p:spPr/>
-        <p:txBody>
-          <a:bodyPr/>
-          <a:lstStyle/>
-          <a:p>
-            <a:r>
-              <a:rPr lang="en-US" dirty="0" smtClean="0"/>
-              <a:t>Potential Future Work</a:t>
-            </a:r>
-            <a:endParaRPr lang="en-US" dirty="0"/>
-          </a:p>
-        </p:txBody>
-      </p:sp>
-      <p:sp>
-        <p:nvSpPr>
-          <p:cNvPr id="3" name="Content Placeholder 2"/>
-          <p:cNvSpPr>
-            <a:spLocks noGrp="1"/>
-          </p:cNvSpPr>
-          <p:nvPr>
-            <p:ph idx="1"/>
-          </p:nvPr>
-        </p:nvSpPr>
-        <p:spPr/>
-        <p:txBody>
-          <a:bodyPr/>
-          <a:lstStyle/>
-          <a:p>
-            <a:r>
-              <a:rPr lang="en-US" dirty="0" smtClean="0"/>
+              <a:rPr lang="en-US" sz="2400" dirty="0"/>
               <a:t>Implement for POST based pre-fetch.</a:t>
             </a:r>
           </a:p>
           <a:p>
             <a:r>
-              <a:rPr lang="en-US" dirty="0" smtClean="0"/>
+              <a:rPr lang="en-US" sz="2400" dirty="0"/>
               <a:t>Analyze at Byte Code level</a:t>
             </a:r>
           </a:p>
           <a:p>
             <a:r>
-              <a:rPr lang="en-US" dirty="0" smtClean="0"/>
+              <a:rPr lang="en-US" sz="2400" dirty="0"/>
               <a:t>Identify more patterns</a:t>
             </a:r>
           </a:p>
           <a:p>
             <a:r>
-              <a:rPr lang="en-US" dirty="0" smtClean="0"/>
+              <a:rPr lang="en-US" sz="2400" dirty="0"/>
               <a:t>Test on more applications.</a:t>
             </a:r>
           </a:p>
           <a:p>
-            <a:endParaRPr lang="en-US" dirty="0"/>
+            <a:endParaRPr lang="en-US" sz="2400" dirty="0"/>
           </a:p>
         </p:txBody>
       </p:sp>
@@ -13414,7 +13433,7 @@
           <a:p>
             <a:pPr algn="ctr"/>
             <a:r>
-              <a:rPr lang="en-US" sz="5400" dirty="0" smtClean="0">
+              <a:rPr lang="en-US" sz="5400" dirty="0">
                 <a:ln w="0"/>
                 <a:solidFill>
                   <a:schemeClr val="accent1"/>
@@ -13529,7 +13548,7 @@
           <a:p>
             <a:pPr algn="ctr"/>
             <a:r>
-              <a:rPr lang="en-US" sz="5400" dirty="0" smtClean="0">
+              <a:rPr lang="en-US" sz="5400" dirty="0">
                 <a:ln w="0"/>
                 <a:solidFill>
                   <a:schemeClr val="accent1"/>
@@ -13655,10 +13674,9 @@
           </a:lstStyle>
           <a:p>
             <a:r>
-              <a:rPr lang="en-US" dirty="0" smtClean="0"/>
+              <a:rPr lang="en-US" dirty="0"/>
               <a:t>Story of a Developer and a User</a:t>
             </a:r>
-            <a:endParaRPr lang="en-US" dirty="0"/>
           </a:p>
         </p:txBody>
       </p:sp>
@@ -13672,14 +13690,6 @@
   <p:clrMapOvr>
     <a:masterClrMapping/>
   </p:clrMapOvr>
-  <mc:AlternateContent xmlns:mc="http://schemas.openxmlformats.org/markup-compatibility/2006" xmlns:p14="http://schemas.microsoft.com/office/powerpoint/2010/main">
-    <mc:Choice Requires="p14">
-      <p:transition p14:dur="0"/>
-    </mc:Choice>
-    <mc:Fallback xmlns="">
-      <p:transition/>
-    </mc:Fallback>
-  </mc:AlternateContent>
   <p:timing>
     <p:tnLst>
       <p:par>
@@ -13874,7 +13884,7 @@
           <a:p>
             <a:pPr algn="ctr"/>
             <a:r>
-              <a:rPr lang="en-US" sz="5400" dirty="0" smtClean="0">
+              <a:rPr lang="en-US" sz="5400" dirty="0">
                 <a:ln w="0"/>
                 <a:solidFill>
                   <a:schemeClr val="accent1"/>
@@ -13922,64 +13932,66 @@
           </a:xfrm>
         </p:spPr>
         <p:txBody>
-          <a:bodyPr/>
+          <a:bodyPr>
+            <a:normAutofit/>
+          </a:bodyPr>
           <a:lstStyle/>
           <a:p>
             <a:r>
-              <a:rPr lang="en-US" dirty="0" smtClean="0"/>
+              <a:rPr lang="en-US" sz="2400" dirty="0"/>
               <a:t>I will make a </a:t>
             </a:r>
             <a:r>
-              <a:rPr lang="en-US" b="1" i="1" dirty="0" smtClean="0"/>
+              <a:rPr lang="en-US" sz="2400" b="1" i="1" dirty="0"/>
               <a:t>Super Cool</a:t>
             </a:r>
             <a:r>
-              <a:rPr lang="en-US" dirty="0" smtClean="0"/>
+              <a:rPr lang="en-US" sz="2400" dirty="0"/>
               <a:t> app.</a:t>
             </a:r>
           </a:p>
           <a:p>
-            <a:endParaRPr lang="en-US" dirty="0"/>
-          </a:p>
-          <a:p>
-            <a:r>
-              <a:rPr lang="en-US" dirty="0" smtClean="0"/>
+            <a:endParaRPr lang="en-US" sz="2400" dirty="0"/>
+          </a:p>
+          <a:p>
+            <a:r>
+              <a:rPr lang="en-US" sz="2400" dirty="0"/>
               <a:t>The app should be fast and have no latency.</a:t>
             </a:r>
           </a:p>
           <a:p>
-            <a:endParaRPr lang="en-US" dirty="0"/>
-          </a:p>
-          <a:p>
-            <a:r>
-              <a:rPr lang="en-US" dirty="0" smtClean="0"/>
+            <a:endParaRPr lang="en-US" sz="2400" dirty="0"/>
+          </a:p>
+          <a:p>
+            <a:r>
+              <a:rPr lang="en-US" sz="2400" dirty="0"/>
               <a:t>How do I make it Fast? </a:t>
             </a:r>
           </a:p>
           <a:p>
-            <a:endParaRPr lang="en-US" b="1" i="1" dirty="0"/>
-          </a:p>
-          <a:p>
-            <a:r>
-              <a:rPr lang="en-US" b="1" i="1" dirty="0" smtClean="0"/>
+            <a:endParaRPr lang="en-US" sz="2400" b="1" i="1" dirty="0"/>
+          </a:p>
+          <a:p>
+            <a:r>
+              <a:rPr lang="en-US" sz="2400" b="1" i="1" dirty="0"/>
               <a:t>Solution: Pre-fetch</a:t>
             </a:r>
             <a:r>
-              <a:rPr lang="en-US" dirty="0" smtClean="0"/>
+              <a:rPr lang="en-US" sz="2400" dirty="0"/>
               <a:t>.</a:t>
             </a:r>
           </a:p>
           <a:p>
-            <a:endParaRPr lang="en-US" dirty="0"/>
-          </a:p>
-          <a:p>
-            <a:endParaRPr lang="en-US" dirty="0" smtClean="0"/>
-          </a:p>
-          <a:p>
-            <a:endParaRPr lang="en-US" dirty="0"/>
-          </a:p>
-          <a:p>
-            <a:endParaRPr lang="en-US" dirty="0"/>
+            <a:endParaRPr lang="en-US" sz="2400" dirty="0"/>
+          </a:p>
+          <a:p>
+            <a:endParaRPr lang="en-US" sz="2400" dirty="0"/>
+          </a:p>
+          <a:p>
+            <a:endParaRPr lang="en-US" sz="2400" dirty="0"/>
+          </a:p>
+          <a:p>
+            <a:endParaRPr lang="en-US" sz="2400" dirty="0"/>
           </a:p>
         </p:txBody>
       </p:sp>
@@ -14112,7 +14124,7 @@
           <a:p>
             <a:pPr algn="ctr"/>
             <a:r>
-              <a:rPr lang="en-US" sz="5400" dirty="0" smtClean="0">
+              <a:rPr lang="en-US" sz="5400" dirty="0">
                 <a:ln w="0"/>
                 <a:solidFill>
                   <a:schemeClr val="accent1"/>
@@ -14160,54 +14172,56 @@
           </a:xfrm>
         </p:spPr>
         <p:txBody>
-          <a:bodyPr/>
+          <a:bodyPr>
+            <a:normAutofit/>
+          </a:bodyPr>
           <a:lstStyle/>
           <a:p>
             <a:r>
-              <a:rPr lang="en-US" dirty="0" smtClean="0"/>
+              <a:rPr lang="en-US" sz="2400" dirty="0"/>
               <a:t>Installs the </a:t>
             </a:r>
             <a:r>
-              <a:rPr lang="en-US" b="1" i="1" dirty="0" smtClean="0"/>
+              <a:rPr lang="en-US" sz="2400" b="1" i="1" dirty="0"/>
               <a:t>Cool app</a:t>
             </a:r>
             <a:r>
-              <a:rPr lang="en-US" dirty="0" smtClean="0"/>
+              <a:rPr lang="en-US" sz="2400" dirty="0"/>
               <a:t>.</a:t>
             </a:r>
           </a:p>
           <a:p>
-            <a:endParaRPr lang="en-US" dirty="0"/>
-          </a:p>
-          <a:p>
-            <a:r>
-              <a:rPr lang="en-US" dirty="0" smtClean="0"/>
+            <a:endParaRPr lang="en-US" sz="2400" dirty="0"/>
+          </a:p>
+          <a:p>
+            <a:r>
+              <a:rPr lang="en-US" sz="2400" dirty="0"/>
               <a:t>Uses it for few days.</a:t>
             </a:r>
           </a:p>
           <a:p>
-            <a:endParaRPr lang="en-US" dirty="0"/>
-          </a:p>
-          <a:p>
-            <a:r>
-              <a:rPr lang="en-US" b="1" i="1" dirty="0" smtClean="0"/>
+            <a:endParaRPr lang="en-US" sz="2400" dirty="0"/>
+          </a:p>
+          <a:p>
+            <a:r>
+              <a:rPr lang="en-US" sz="2400" b="1" i="1" dirty="0"/>
               <a:t>Reaction: Wow! This app is so fast and useful.</a:t>
             </a:r>
           </a:p>
           <a:p>
-            <a:endParaRPr lang="en-US" b="1" i="1" dirty="0"/>
-          </a:p>
-          <a:p>
-            <a:endParaRPr lang="en-US" dirty="0"/>
-          </a:p>
-          <a:p>
-            <a:endParaRPr lang="en-US" dirty="0" smtClean="0"/>
-          </a:p>
-          <a:p>
-            <a:endParaRPr lang="en-US" dirty="0"/>
-          </a:p>
-          <a:p>
-            <a:endParaRPr lang="en-US" dirty="0"/>
+            <a:endParaRPr lang="en-US" sz="2400" b="1" i="1" dirty="0"/>
+          </a:p>
+          <a:p>
+            <a:endParaRPr lang="en-US" sz="2400" dirty="0"/>
+          </a:p>
+          <a:p>
+            <a:endParaRPr lang="en-US" sz="2400" dirty="0"/>
+          </a:p>
+          <a:p>
+            <a:endParaRPr lang="en-US" sz="2400" dirty="0"/>
+          </a:p>
+          <a:p>
+            <a:endParaRPr lang="en-US" sz="2400" dirty="0"/>
           </a:p>
         </p:txBody>
       </p:sp>
@@ -14363,49 +14377,51 @@
           </a:xfrm>
         </p:spPr>
         <p:txBody>
-          <a:bodyPr/>
+          <a:bodyPr>
+            <a:normAutofit fontScale="92500" lnSpcReduction="10000"/>
+          </a:bodyPr>
           <a:lstStyle/>
           <a:p>
-            <a:endParaRPr lang="en-US" dirty="0" smtClean="0"/>
-          </a:p>
-          <a:p>
-            <a:r>
-              <a:rPr lang="en-US" b="1" i="1" dirty="0" smtClean="0"/>
+            <a:endParaRPr lang="en-US" sz="2400" dirty="0"/>
+          </a:p>
+          <a:p>
+            <a:r>
+              <a:rPr lang="en-US" sz="2400" b="1" i="1" dirty="0"/>
               <a:t>Reaction: </a:t>
             </a:r>
           </a:p>
           <a:p>
-            <a:endParaRPr lang="en-US" b="1" i="1" dirty="0"/>
-          </a:p>
-          <a:p>
-            <a:r>
-              <a:rPr lang="en-US" b="1" i="1" dirty="0" smtClean="0"/>
+            <a:endParaRPr lang="en-US" sz="2400" b="1" i="1" dirty="0"/>
+          </a:p>
+          <a:p>
+            <a:r>
+              <a:rPr lang="en-US" sz="2400" b="1" i="1" dirty="0"/>
               <a:t>This App Used Up All my LTE data. Uninstall !!!!</a:t>
             </a:r>
           </a:p>
           <a:p>
-            <a:endParaRPr lang="en-US" b="1" i="1" dirty="0"/>
-          </a:p>
-          <a:p>
-            <a:r>
-              <a:rPr lang="en-US" b="1" i="1" dirty="0" smtClean="0"/>
+            <a:endParaRPr lang="en-US" sz="2400" b="1" i="1" dirty="0"/>
+          </a:p>
+          <a:p>
+            <a:r>
+              <a:rPr lang="en-US" sz="2400" b="1" i="1" dirty="0"/>
               <a:t>I’ll search for a new App.</a:t>
             </a:r>
           </a:p>
           <a:p>
-            <a:endParaRPr lang="en-US" b="1" i="1" dirty="0"/>
-          </a:p>
-          <a:p>
-            <a:endParaRPr lang="en-US" dirty="0"/>
-          </a:p>
-          <a:p>
-            <a:endParaRPr lang="en-US" dirty="0" smtClean="0"/>
-          </a:p>
-          <a:p>
-            <a:endParaRPr lang="en-US" dirty="0"/>
-          </a:p>
-          <a:p>
-            <a:endParaRPr lang="en-US" dirty="0"/>
+            <a:endParaRPr lang="en-US" sz="2400" b="1" i="1" dirty="0"/>
+          </a:p>
+          <a:p>
+            <a:endParaRPr lang="en-US" sz="2400" dirty="0"/>
+          </a:p>
+          <a:p>
+            <a:endParaRPr lang="en-US" sz="2400" dirty="0"/>
+          </a:p>
+          <a:p>
+            <a:endParaRPr lang="en-US" sz="2400" dirty="0"/>
+          </a:p>
+          <a:p>
+            <a:endParaRPr lang="en-US" sz="2400" dirty="0"/>
           </a:p>
         </p:txBody>
       </p:sp>
@@ -14430,10 +14446,9 @@
           <a:lstStyle/>
           <a:p>
             <a:r>
-              <a:rPr lang="en-US" dirty="0" smtClean="0"/>
+              <a:rPr lang="en-US" dirty="0"/>
               <a:t>A Month Later...</a:t>
             </a:r>
-            <a:endParaRPr lang="en-US" dirty="0"/>
           </a:p>
         </p:txBody>
       </p:sp>
@@ -14491,7 +14506,7 @@
           <a:p>
             <a:pPr algn="ctr"/>
             <a:r>
-              <a:rPr lang="en-US" sz="5400" dirty="0" smtClean="0">
+              <a:rPr lang="en-US" sz="5400" dirty="0">
                 <a:ln w="0"/>
                 <a:solidFill>
                   <a:schemeClr val="accent1"/>
@@ -14532,13 +14547,6 @@
   <p:clrMapOvr>
     <a:masterClrMapping/>
   </p:clrMapOvr>
-  <p:timing>
-    <p:tnLst>
-      <p:par>
-        <p:cTn id="1" dur="indefinite" restart="never" nodeType="tmRoot"/>
-      </p:par>
-    </p:tnLst>
-  </p:timing>
 </p:sld>
 </file>
 
@@ -14613,7 +14621,7 @@
           <a:p>
             <a:pPr algn="ctr"/>
             <a:r>
-              <a:rPr lang="en-US" sz="5400" dirty="0" smtClean="0">
+              <a:rPr lang="en-US" sz="5400" dirty="0">
                 <a:ln w="0"/>
                 <a:solidFill>
                   <a:schemeClr val="accent1"/>
@@ -14698,7 +14706,7 @@
           <a:p>
             <a:pPr algn="ctr"/>
             <a:r>
-              <a:rPr lang="en-US" sz="5400" dirty="0" smtClean="0">
+              <a:rPr lang="en-US" sz="5400" dirty="0">
                 <a:ln w="0"/>
                 <a:solidFill>
                   <a:schemeClr val="accent1"/>
@@ -14780,10 +14788,9 @@
           <a:lstStyle/>
           <a:p>
             <a:r>
-              <a:rPr lang="en-US" dirty="0" smtClean="0"/>
+              <a:rPr lang="en-US" dirty="0"/>
               <a:t>Our Aim</a:t>
             </a:r>
-            <a:endParaRPr lang="en-US" dirty="0"/>
           </a:p>
         </p:txBody>
       </p:sp>
@@ -14856,11 +14863,13 @@
           </a:xfrm>
         </p:spPr>
         <p:txBody>
-          <a:bodyPr/>
+          <a:bodyPr>
+            <a:normAutofit/>
+          </a:bodyPr>
           <a:lstStyle/>
           <a:p>
             <a:r>
-              <a:rPr lang="en-US" dirty="0"/>
+              <a:rPr lang="en-US" sz="2400" dirty="0"/>
               <a:t>Android Common Pattern</a:t>
             </a:r>
           </a:p>
@@ -14901,7 +14910,7 @@
           <a:lstStyle/>
           <a:p>
             <a:r>
-              <a:rPr lang="en-US" dirty="0">
+              <a:rPr lang="en-US" sz="2000" dirty="0">
                 <a:solidFill>
                   <a:schemeClr val="tx1"/>
                 </a:solidFill>
@@ -14910,7 +14919,7 @@
             </a:r>
           </a:p>
           <a:p>
-            <a:endParaRPr lang="en-US" dirty="0">
+            <a:endParaRPr lang="en-US" sz="2000" dirty="0">
               <a:solidFill>
                 <a:schemeClr val="tx1"/>
               </a:solidFill>
@@ -14918,7 +14927,7 @@
           </a:p>
           <a:p>
             <a:r>
-              <a:rPr lang="en-US" dirty="0">
+              <a:rPr lang="en-US" sz="2000" dirty="0">
                 <a:solidFill>
                   <a:schemeClr val="tx1"/>
                 </a:solidFill>
@@ -14926,7 +14935,7 @@
               <a:t>var1 &lt;= </a:t>
             </a:r>
             <a:r>
-              <a:rPr lang="en-US" dirty="0" err="1">
+              <a:rPr lang="en-US" sz="2000" dirty="0" err="1">
                 <a:solidFill>
                   <a:schemeClr val="tx1"/>
                 </a:solidFill>
@@ -14934,7 +14943,7 @@
               <a:t>networkFetch</a:t>
             </a:r>
             <a:r>
-              <a:rPr lang="en-US" dirty="0">
+              <a:rPr lang="en-US" sz="2000" dirty="0">
                 <a:solidFill>
                   <a:schemeClr val="tx1"/>
                 </a:solidFill>
@@ -14943,7 +14952,7 @@
             </a:r>
           </a:p>
           <a:p>
-            <a:endParaRPr lang="en-US" dirty="0">
+            <a:endParaRPr lang="en-US" sz="2000" dirty="0">
               <a:solidFill>
                 <a:schemeClr val="tx1"/>
               </a:solidFill>
@@ -14951,7 +14960,32 @@
           </a:p>
           <a:p>
             <a:r>
-              <a:rPr lang="en-US" dirty="0">
+              <a:rPr lang="en-US" sz="2000" dirty="0" err="1">
+                <a:solidFill>
+                  <a:schemeClr val="tx1"/>
+                </a:solidFill>
+              </a:rPr>
+              <a:t>textView.setText</a:t>
+            </a:r>
+            <a:r>
+              <a:rPr lang="en-US" sz="2000" dirty="0">
+                <a:solidFill>
+                  <a:schemeClr val="tx1"/>
+                </a:solidFill>
+              </a:rPr>
+              <a:t>(var2)</a:t>
+            </a:r>
+          </a:p>
+          <a:p>
+            <a:endParaRPr lang="en-US" sz="2000" dirty="0">
+              <a:solidFill>
+                <a:schemeClr val="tx1"/>
+              </a:solidFill>
+            </a:endParaRPr>
+          </a:p>
+          <a:p>
+            <a:r>
+              <a:rPr lang="en-US" sz="2000" dirty="0">
                 <a:solidFill>
                   <a:schemeClr val="tx1"/>
                 </a:solidFill>
@@ -14959,7 +14993,7 @@
               <a:t>var2 &lt;= </a:t>
             </a:r>
             <a:r>
-              <a:rPr lang="en-US" dirty="0" err="1">
+              <a:rPr lang="en-US" sz="2000" dirty="0" err="1">
                 <a:solidFill>
                   <a:schemeClr val="tx1"/>
                 </a:solidFill>
@@ -14967,7 +15001,7 @@
               <a:t>networkFetch</a:t>
             </a:r>
             <a:r>
-              <a:rPr lang="en-US" dirty="0">
+              <a:rPr lang="en-US" sz="2000" dirty="0">
                 <a:solidFill>
                   <a:schemeClr val="tx1"/>
                 </a:solidFill>
@@ -14976,7 +15010,7 @@
             </a:r>
           </a:p>
           <a:p>
-            <a:endParaRPr lang="en-US" dirty="0">
+            <a:endParaRPr lang="en-US" sz="2000" dirty="0">
               <a:solidFill>
                 <a:schemeClr val="tx1"/>
               </a:solidFill>
@@ -14984,7 +15018,7 @@
           </a:p>
           <a:p>
             <a:r>
-              <a:rPr lang="en-US" dirty="0">
+              <a:rPr lang="en-US" sz="2000" dirty="0">
                 <a:solidFill>
                   <a:schemeClr val="tx1"/>
                 </a:solidFill>
@@ -14993,7 +15027,7 @@
             </a:r>
           </a:p>
           <a:p>
-            <a:endParaRPr lang="en-US" dirty="0">
+            <a:endParaRPr lang="en-US" sz="2000" dirty="0">
               <a:solidFill>
                 <a:schemeClr val="tx1"/>
               </a:solidFill>
@@ -15001,7 +15035,7 @@
           </a:p>
           <a:p>
             <a:r>
-              <a:rPr lang="en-US" dirty="0">
+              <a:rPr lang="en-US" sz="2000" dirty="0">
                 <a:solidFill>
                   <a:schemeClr val="tx1"/>
                 </a:solidFill>
@@ -15046,7 +15080,7 @@
           <a:lstStyle/>
           <a:p>
             <a:r>
-              <a:rPr lang="en-US" dirty="0">
+              <a:rPr lang="en-US" sz="2000" dirty="0">
                 <a:solidFill>
                   <a:schemeClr val="tx1"/>
                 </a:solidFill>
@@ -15055,7 +15089,7 @@
             </a:r>
           </a:p>
           <a:p>
-            <a:endParaRPr lang="en-US" dirty="0">
+            <a:endParaRPr lang="en-US" sz="2000" dirty="0">
               <a:solidFill>
                 <a:schemeClr val="tx1"/>
               </a:solidFill>
@@ -15063,7 +15097,7 @@
           </a:p>
           <a:p>
             <a:r>
-              <a:rPr lang="en-US" dirty="0" err="1">
+              <a:rPr lang="en-US" sz="2000" dirty="0" err="1">
                 <a:solidFill>
                   <a:schemeClr val="tx1"/>
                 </a:solidFill>
@@ -15071,7 +15105,7 @@
               <a:t>textView.setText</a:t>
             </a:r>
             <a:r>
-              <a:rPr lang="en-US" dirty="0">
+              <a:rPr lang="en-US" sz="2000" dirty="0">
                 <a:solidFill>
                   <a:schemeClr val="tx1"/>
                 </a:solidFill>
@@ -15080,7 +15114,7 @@
             </a:r>
           </a:p>
           <a:p>
-            <a:endParaRPr lang="en-US" dirty="0">
+            <a:endParaRPr lang="en-US" sz="2000" dirty="0">
               <a:solidFill>
                 <a:schemeClr val="tx1"/>
               </a:solidFill>
@@ -15088,7 +15122,7 @@
           </a:p>
           <a:p>
             <a:r>
-              <a:rPr lang="en-US" dirty="0">
+              <a:rPr lang="en-US" sz="2000" dirty="0">
                 <a:solidFill>
                   <a:schemeClr val="tx1"/>
                 </a:solidFill>

</xml_diff>

<commit_message>
Edit static analysis in ppt
</commit_message>
<xml_diff>
--- a/Prefetch Procrastinator Final Presentation.pptx
+++ b/Prefetch Procrastinator Final Presentation.pptx
@@ -11192,8 +11192,8 @@
         </p:nvSpPr>
         <p:spPr>
           <a:xfrm>
-            <a:off x="8067910" y="3771339"/>
-            <a:ext cx="1878978" cy="1531219"/>
+            <a:off x="8061408" y="3666836"/>
+            <a:ext cx="1878978" cy="1745673"/>
           </a:xfrm>
           <a:prstGeom prst="rect">
             <a:avLst/>
@@ -11229,7 +11229,7 @@
                   <a:schemeClr val="tx1"/>
                 </a:solidFill>
               </a:rPr>
-              <a:t>Execute network call for prefetch variable when intent invoked</a:t>
+              <a:t>Inject Code: Execute network call for prefetch variable when intent invoked</a:t>
             </a:r>
           </a:p>
         </p:txBody>
@@ -11310,15 +11310,16 @@
         <p:nvCxnSpPr>
           <p:cNvPr id="16" name="Straight Arrow Connector 15"/>
           <p:cNvCxnSpPr>
+            <a:cxnSpLocks/>
             <a:stCxn id="7" idx="3"/>
             <a:endCxn id="8" idx="1"/>
           </p:cNvCxnSpPr>
           <p:nvPr/>
         </p:nvCxnSpPr>
         <p:spPr>
-          <a:xfrm flipV="1">
-            <a:off x="7017176" y="4536949"/>
-            <a:ext cx="1050734" cy="1"/>
+          <a:xfrm>
+            <a:off x="7017176" y="4536950"/>
+            <a:ext cx="1044232" cy="2723"/>
           </a:xfrm>
           <a:prstGeom prst="straightConnector1">
             <a:avLst/>
@@ -11472,8 +11473,8 @@
         </p:nvSpPr>
         <p:spPr>
           <a:xfrm>
-            <a:off x="5993841" y="3296097"/>
-            <a:ext cx="506870" cy="369332"/>
+            <a:off x="5495432" y="2358292"/>
+            <a:ext cx="1760418" cy="646331"/>
           </a:xfrm>
           <a:prstGeom prst="rect">
             <a:avLst/>
@@ -11488,7 +11489,13 @@
           <a:p>
             <a:r>
               <a:rPr lang="en-US" dirty="0"/>
-              <a:t>No</a:t>
+              <a:t>No, check for </a:t>
+            </a:r>
+          </a:p>
+          <a:p>
+            <a:r>
+              <a:rPr lang="en-US" dirty="0"/>
+              <a:t>next variable</a:t>
             </a:r>
           </a:p>
         </p:txBody>
@@ -14973,7 +14980,7 @@
                   <a:schemeClr val="tx1"/>
                 </a:solidFill>
               </a:rPr>
-              <a:t>(var2)</a:t>
+              <a:t>(var1)</a:t>
             </a:r>
           </a:p>
           <a:p>

</xml_diff>

<commit_message>
Spelling mistake in slide
</commit_message>
<xml_diff>
--- a/Prefetch Procrastinator Final Presentation.pptx
+++ b/Prefetch Procrastinator Final Presentation.pptx
@@ -2926,12 +2926,20 @@
         <a:lstStyle/>
         <a:p>
           <a:r>
+            <a:rPr lang="en-US" sz="2000">
+              <a:solidFill>
+                <a:schemeClr val="tx1"/>
+              </a:solidFill>
+            </a:rPr>
+            <a:t>Procrastination </a:t>
+          </a:r>
+          <a:r>
             <a:rPr lang="en-US" sz="2000" dirty="0">
               <a:solidFill>
                 <a:schemeClr val="tx1"/>
               </a:solidFill>
             </a:rPr>
-            <a:t>Procrastinated Library</a:t>
+            <a:t>Library</a:t>
           </a:r>
         </a:p>
       </dgm:t>
@@ -3266,12 +3274,20 @@
             <a:buNone/>
           </a:pPr>
           <a:r>
+            <a:rPr lang="en-US" sz="2000" kern="1200">
+              <a:solidFill>
+                <a:schemeClr val="tx1"/>
+              </a:solidFill>
+            </a:rPr>
+            <a:t>Procrastination </a:t>
+          </a:r>
+          <a:r>
             <a:rPr lang="en-US" sz="2000" kern="1200" dirty="0">
               <a:solidFill>
                 <a:schemeClr val="tx1"/>
               </a:solidFill>
             </a:rPr>
-            <a:t>Procrastinated Library</a:t>
+            <a:t>Library</a:t>
           </a:r>
         </a:p>
       </dsp:txBody>
@@ -13794,6 +13810,11 @@
           </p:cNvGraphicFramePr>
           <p:nvPr>
             <p:ph idx="1"/>
+            <p:extLst>
+              <p:ext uri="{D42A27DB-BD31-4B8C-83A1-F6EECF244321}">
+                <p14:modId xmlns:p14="http://schemas.microsoft.com/office/powerpoint/2010/main" val="1388940441"/>
+              </p:ext>
+            </p:extLst>
           </p:nvPr>
         </p:nvGraphicFramePr>
         <p:xfrm>

</xml_diff>